<commit_message>
added a stupid method of getting questions asked
</commit_message>
<xml_diff>
--- a/Documents/UI.pptx
+++ b/Documents/UI.pptx
@@ -216,7 +216,7 @@
           <a:p>
             <a:fld id="{65D2CF22-5DE7-4573-B2C7-F2FD6A1B0721}" type="datetimeFigureOut">
               <a:rPr lang="en-GB" smtClean="0"/>
-              <a:t>05/02/2021</a:t>
+              <a:t>06/02/2021</a:t>
             </a:fld>
             <a:endParaRPr lang="en-GB"/>
           </a:p>
@@ -867,7 +867,7 @@
           <a:p>
             <a:fld id="{7728408F-BD63-4741-B54F-A0ABC6703005}" type="datetimeFigureOut">
               <a:rPr lang="en-GB" smtClean="0"/>
-              <a:t>05/02/2021</a:t>
+              <a:t>06/02/2021</a:t>
             </a:fld>
             <a:endParaRPr lang="en-GB"/>
           </a:p>
@@ -1037,7 +1037,7 @@
           <a:p>
             <a:fld id="{7728408F-BD63-4741-B54F-A0ABC6703005}" type="datetimeFigureOut">
               <a:rPr lang="en-GB" smtClean="0"/>
-              <a:t>05/02/2021</a:t>
+              <a:t>06/02/2021</a:t>
             </a:fld>
             <a:endParaRPr lang="en-GB"/>
           </a:p>
@@ -1217,7 +1217,7 @@
           <a:p>
             <a:fld id="{7728408F-BD63-4741-B54F-A0ABC6703005}" type="datetimeFigureOut">
               <a:rPr lang="en-GB" smtClean="0"/>
-              <a:t>05/02/2021</a:t>
+              <a:t>06/02/2021</a:t>
             </a:fld>
             <a:endParaRPr lang="en-GB"/>
           </a:p>
@@ -1387,7 +1387,7 @@
           <a:p>
             <a:fld id="{7728408F-BD63-4741-B54F-A0ABC6703005}" type="datetimeFigureOut">
               <a:rPr lang="en-GB" smtClean="0"/>
-              <a:t>05/02/2021</a:t>
+              <a:t>06/02/2021</a:t>
             </a:fld>
             <a:endParaRPr lang="en-GB"/>
           </a:p>
@@ -1631,7 +1631,7 @@
           <a:p>
             <a:fld id="{7728408F-BD63-4741-B54F-A0ABC6703005}" type="datetimeFigureOut">
               <a:rPr lang="en-GB" smtClean="0"/>
-              <a:t>05/02/2021</a:t>
+              <a:t>06/02/2021</a:t>
             </a:fld>
             <a:endParaRPr lang="en-GB"/>
           </a:p>
@@ -1863,7 +1863,7 @@
           <a:p>
             <a:fld id="{7728408F-BD63-4741-B54F-A0ABC6703005}" type="datetimeFigureOut">
               <a:rPr lang="en-GB" smtClean="0"/>
-              <a:t>05/02/2021</a:t>
+              <a:t>06/02/2021</a:t>
             </a:fld>
             <a:endParaRPr lang="en-GB"/>
           </a:p>
@@ -2230,7 +2230,7 @@
           <a:p>
             <a:fld id="{7728408F-BD63-4741-B54F-A0ABC6703005}" type="datetimeFigureOut">
               <a:rPr lang="en-GB" smtClean="0"/>
-              <a:t>05/02/2021</a:t>
+              <a:t>06/02/2021</a:t>
             </a:fld>
             <a:endParaRPr lang="en-GB"/>
           </a:p>
@@ -2348,7 +2348,7 @@
           <a:p>
             <a:fld id="{7728408F-BD63-4741-B54F-A0ABC6703005}" type="datetimeFigureOut">
               <a:rPr lang="en-GB" smtClean="0"/>
-              <a:t>05/02/2021</a:t>
+              <a:t>06/02/2021</a:t>
             </a:fld>
             <a:endParaRPr lang="en-GB"/>
           </a:p>
@@ -2443,7 +2443,7 @@
           <a:p>
             <a:fld id="{7728408F-BD63-4741-B54F-A0ABC6703005}" type="datetimeFigureOut">
               <a:rPr lang="en-GB" smtClean="0"/>
-              <a:t>05/02/2021</a:t>
+              <a:t>06/02/2021</a:t>
             </a:fld>
             <a:endParaRPr lang="en-GB"/>
           </a:p>
@@ -2720,7 +2720,7 @@
           <a:p>
             <a:fld id="{7728408F-BD63-4741-B54F-A0ABC6703005}" type="datetimeFigureOut">
               <a:rPr lang="en-GB" smtClean="0"/>
-              <a:t>05/02/2021</a:t>
+              <a:t>06/02/2021</a:t>
             </a:fld>
             <a:endParaRPr lang="en-GB"/>
           </a:p>
@@ -2977,7 +2977,7 @@
           <a:p>
             <a:fld id="{7728408F-BD63-4741-B54F-A0ABC6703005}" type="datetimeFigureOut">
               <a:rPr lang="en-GB" smtClean="0"/>
-              <a:t>05/02/2021</a:t>
+              <a:t>06/02/2021</a:t>
             </a:fld>
             <a:endParaRPr lang="en-GB"/>
           </a:p>
@@ -3190,7 +3190,7 @@
           <a:p>
             <a:fld id="{7728408F-BD63-4741-B54F-A0ABC6703005}" type="datetimeFigureOut">
               <a:rPr lang="en-GB" smtClean="0"/>
-              <a:t>05/02/2021</a:t>
+              <a:t>06/02/2021</a:t>
             </a:fld>
             <a:endParaRPr lang="en-GB"/>
           </a:p>
@@ -7654,7 +7654,7 @@
         </p:nvSpPr>
         <p:spPr>
           <a:xfrm>
-            <a:off x="6846999" y="1133556"/>
+            <a:off x="6850989" y="1202136"/>
             <a:ext cx="219844" cy="2065486"/>
           </a:xfrm>
           <a:prstGeom prst="rect">

</xml_diff>

<commit_message>
Moved and added some new figures to explain app better
</commit_message>
<xml_diff>
--- a/Documents/UI.pptx
+++ b/Documents/UI.pptx
@@ -224,7 +224,7 @@
           <a:p>
             <a:fld id="{65D2CF22-5DE7-4573-B2C7-F2FD6A1B0721}" type="datetimeFigureOut">
               <a:rPr lang="en-GB" smtClean="0"/>
-              <a:t>23/04/2021</a:t>
+              <a:t>29/04/2021</a:t>
             </a:fld>
             <a:endParaRPr lang="en-GB"/>
           </a:p>
@@ -959,7 +959,7 @@
           <a:p>
             <a:fld id="{7728408F-BD63-4741-B54F-A0ABC6703005}" type="datetimeFigureOut">
               <a:rPr lang="en-GB" smtClean="0"/>
-              <a:t>23/04/2021</a:t>
+              <a:t>29/04/2021</a:t>
             </a:fld>
             <a:endParaRPr lang="en-GB"/>
           </a:p>
@@ -1129,7 +1129,7 @@
           <a:p>
             <a:fld id="{7728408F-BD63-4741-B54F-A0ABC6703005}" type="datetimeFigureOut">
               <a:rPr lang="en-GB" smtClean="0"/>
-              <a:t>23/04/2021</a:t>
+              <a:t>29/04/2021</a:t>
             </a:fld>
             <a:endParaRPr lang="en-GB"/>
           </a:p>
@@ -1309,7 +1309,7 @@
           <a:p>
             <a:fld id="{7728408F-BD63-4741-B54F-A0ABC6703005}" type="datetimeFigureOut">
               <a:rPr lang="en-GB" smtClean="0"/>
-              <a:t>23/04/2021</a:t>
+              <a:t>29/04/2021</a:t>
             </a:fld>
             <a:endParaRPr lang="en-GB"/>
           </a:p>
@@ -1479,7 +1479,7 @@
           <a:p>
             <a:fld id="{7728408F-BD63-4741-B54F-A0ABC6703005}" type="datetimeFigureOut">
               <a:rPr lang="en-GB" smtClean="0"/>
-              <a:t>23/04/2021</a:t>
+              <a:t>29/04/2021</a:t>
             </a:fld>
             <a:endParaRPr lang="en-GB"/>
           </a:p>
@@ -1723,7 +1723,7 @@
           <a:p>
             <a:fld id="{7728408F-BD63-4741-B54F-A0ABC6703005}" type="datetimeFigureOut">
               <a:rPr lang="en-GB" smtClean="0"/>
-              <a:t>23/04/2021</a:t>
+              <a:t>29/04/2021</a:t>
             </a:fld>
             <a:endParaRPr lang="en-GB"/>
           </a:p>
@@ -1955,7 +1955,7 @@
           <a:p>
             <a:fld id="{7728408F-BD63-4741-B54F-A0ABC6703005}" type="datetimeFigureOut">
               <a:rPr lang="en-GB" smtClean="0"/>
-              <a:t>23/04/2021</a:t>
+              <a:t>29/04/2021</a:t>
             </a:fld>
             <a:endParaRPr lang="en-GB"/>
           </a:p>
@@ -2322,7 +2322,7 @@
           <a:p>
             <a:fld id="{7728408F-BD63-4741-B54F-A0ABC6703005}" type="datetimeFigureOut">
               <a:rPr lang="en-GB" smtClean="0"/>
-              <a:t>23/04/2021</a:t>
+              <a:t>29/04/2021</a:t>
             </a:fld>
             <a:endParaRPr lang="en-GB"/>
           </a:p>
@@ -2440,7 +2440,7 @@
           <a:p>
             <a:fld id="{7728408F-BD63-4741-B54F-A0ABC6703005}" type="datetimeFigureOut">
               <a:rPr lang="en-GB" smtClean="0"/>
-              <a:t>23/04/2021</a:t>
+              <a:t>29/04/2021</a:t>
             </a:fld>
             <a:endParaRPr lang="en-GB"/>
           </a:p>
@@ -2535,7 +2535,7 @@
           <a:p>
             <a:fld id="{7728408F-BD63-4741-B54F-A0ABC6703005}" type="datetimeFigureOut">
               <a:rPr lang="en-GB" smtClean="0"/>
-              <a:t>23/04/2021</a:t>
+              <a:t>29/04/2021</a:t>
             </a:fld>
             <a:endParaRPr lang="en-GB"/>
           </a:p>
@@ -2812,7 +2812,7 @@
           <a:p>
             <a:fld id="{7728408F-BD63-4741-B54F-A0ABC6703005}" type="datetimeFigureOut">
               <a:rPr lang="en-GB" smtClean="0"/>
-              <a:t>23/04/2021</a:t>
+              <a:t>29/04/2021</a:t>
             </a:fld>
             <a:endParaRPr lang="en-GB"/>
           </a:p>
@@ -3069,7 +3069,7 @@
           <a:p>
             <a:fld id="{7728408F-BD63-4741-B54F-A0ABC6703005}" type="datetimeFigureOut">
               <a:rPr lang="en-GB" smtClean="0"/>
-              <a:t>23/04/2021</a:t>
+              <a:t>29/04/2021</a:t>
             </a:fld>
             <a:endParaRPr lang="en-GB"/>
           </a:p>
@@ -3282,7 +3282,7 @@
           <a:p>
             <a:fld id="{7728408F-BD63-4741-B54F-A0ABC6703005}" type="datetimeFigureOut">
               <a:rPr lang="en-GB" smtClean="0"/>
-              <a:t>23/04/2021</a:t>
+              <a:t>29/04/2021</a:t>
             </a:fld>
             <a:endParaRPr lang="en-GB"/>
           </a:p>
@@ -4014,6 +4014,58 @@
           </a:sp3d>
         </p:spPr>
       </p:pic>
+      <p:sp>
+        <p:nvSpPr>
+          <p:cNvPr id="2" name="Rectangle 1">
+            <a:extLst>
+              <a:ext uri="{FF2B5EF4-FFF2-40B4-BE49-F238E27FC236}">
+                <a16:creationId xmlns:a16="http://schemas.microsoft.com/office/drawing/2014/main" id="{F23E795B-03A1-4932-864F-EBDE2F04EE78}"/>
+              </a:ext>
+            </a:extLst>
+          </p:cNvPr>
+          <p:cNvSpPr/>
+          <p:nvPr/>
+        </p:nvSpPr>
+        <p:spPr>
+          <a:xfrm>
+            <a:off x="-1" y="0"/>
+            <a:ext cx="7199313" cy="10799763"/>
+          </a:xfrm>
+          <a:prstGeom prst="rect">
+            <a:avLst/>
+          </a:prstGeom>
+          <a:noFill/>
+          <a:ln w="38100">
+            <a:solidFill>
+              <a:schemeClr val="tx1"/>
+            </a:solidFill>
+          </a:ln>
+        </p:spPr>
+        <p:style>
+          <a:lnRef idx="2">
+            <a:schemeClr val="accent1">
+              <a:shade val="50000"/>
+            </a:schemeClr>
+          </a:lnRef>
+          <a:fillRef idx="1">
+            <a:schemeClr val="accent1"/>
+          </a:fillRef>
+          <a:effectRef idx="0">
+            <a:schemeClr val="accent1"/>
+          </a:effectRef>
+          <a:fontRef idx="minor">
+            <a:schemeClr val="lt1"/>
+          </a:fontRef>
+        </p:style>
+        <p:txBody>
+          <a:bodyPr rtlCol="0" anchor="ctr"/>
+          <a:lstStyle/>
+          <a:p>
+            <a:pPr algn="ctr"/>
+            <a:endParaRPr lang="en-GB"/>
+          </a:p>
+        </p:txBody>
+      </p:sp>
     </p:spTree>
     <p:extLst>
       <p:ext uri="{BB962C8B-B14F-4D97-AF65-F5344CB8AC3E}">
@@ -4212,6 +4264,58 @@
           </a:p>
         </p:txBody>
       </p:sp>
+      <p:sp>
+        <p:nvSpPr>
+          <p:cNvPr id="6" name="Rectangle 5">
+            <a:extLst>
+              <a:ext uri="{FF2B5EF4-FFF2-40B4-BE49-F238E27FC236}">
+                <a16:creationId xmlns:a16="http://schemas.microsoft.com/office/drawing/2014/main" id="{3932030C-D2CE-4359-AF0C-CEC78FA47228}"/>
+              </a:ext>
+            </a:extLst>
+          </p:cNvPr>
+          <p:cNvSpPr/>
+          <p:nvPr/>
+        </p:nvSpPr>
+        <p:spPr>
+          <a:xfrm>
+            <a:off x="-1" y="0"/>
+            <a:ext cx="7199313" cy="10799763"/>
+          </a:xfrm>
+          <a:prstGeom prst="rect">
+            <a:avLst/>
+          </a:prstGeom>
+          <a:noFill/>
+          <a:ln w="38100">
+            <a:solidFill>
+              <a:schemeClr val="tx1"/>
+            </a:solidFill>
+          </a:ln>
+        </p:spPr>
+        <p:style>
+          <a:lnRef idx="2">
+            <a:schemeClr val="accent1">
+              <a:shade val="50000"/>
+            </a:schemeClr>
+          </a:lnRef>
+          <a:fillRef idx="1">
+            <a:schemeClr val="accent1"/>
+          </a:fillRef>
+          <a:effectRef idx="0">
+            <a:schemeClr val="accent1"/>
+          </a:effectRef>
+          <a:fontRef idx="minor">
+            <a:schemeClr val="lt1"/>
+          </a:fontRef>
+        </p:style>
+        <p:txBody>
+          <a:bodyPr rtlCol="0" anchor="ctr"/>
+          <a:lstStyle/>
+          <a:p>
+            <a:pPr algn="ctr"/>
+            <a:endParaRPr lang="en-GB"/>
+          </a:p>
+        </p:txBody>
+      </p:sp>
     </p:spTree>
     <p:extLst>
       <p:ext uri="{BB962C8B-B14F-4D97-AF65-F5344CB8AC3E}">
@@ -4569,6 +4673,58 @@
           </a:sp3d>
         </p:spPr>
       </p:pic>
+      <p:sp>
+        <p:nvSpPr>
+          <p:cNvPr id="11" name="Rectangle 10">
+            <a:extLst>
+              <a:ext uri="{FF2B5EF4-FFF2-40B4-BE49-F238E27FC236}">
+                <a16:creationId xmlns:a16="http://schemas.microsoft.com/office/drawing/2014/main" id="{26742305-A5E8-46DD-90CB-5D244015DC68}"/>
+              </a:ext>
+            </a:extLst>
+          </p:cNvPr>
+          <p:cNvSpPr/>
+          <p:nvPr/>
+        </p:nvSpPr>
+        <p:spPr>
+          <a:xfrm>
+            <a:off x="-1" y="0"/>
+            <a:ext cx="7199313" cy="10799763"/>
+          </a:xfrm>
+          <a:prstGeom prst="rect">
+            <a:avLst/>
+          </a:prstGeom>
+          <a:noFill/>
+          <a:ln w="38100">
+            <a:solidFill>
+              <a:schemeClr val="tx1"/>
+            </a:solidFill>
+          </a:ln>
+        </p:spPr>
+        <p:style>
+          <a:lnRef idx="2">
+            <a:schemeClr val="accent1">
+              <a:shade val="50000"/>
+            </a:schemeClr>
+          </a:lnRef>
+          <a:fillRef idx="1">
+            <a:schemeClr val="accent1"/>
+          </a:fillRef>
+          <a:effectRef idx="0">
+            <a:schemeClr val="accent1"/>
+          </a:effectRef>
+          <a:fontRef idx="minor">
+            <a:schemeClr val="lt1"/>
+          </a:fontRef>
+        </p:style>
+        <p:txBody>
+          <a:bodyPr rtlCol="0" anchor="ctr"/>
+          <a:lstStyle/>
+          <a:p>
+            <a:pPr algn="ctr"/>
+            <a:endParaRPr lang="en-GB"/>
+          </a:p>
+        </p:txBody>
+      </p:sp>
     </p:spTree>
     <p:extLst>
       <p:ext uri="{BB962C8B-B14F-4D97-AF65-F5344CB8AC3E}">
@@ -4613,7 +4769,7 @@
         </p:nvSpPr>
         <p:spPr>
           <a:xfrm>
-            <a:off x="1820778" y="450489"/>
+            <a:off x="1763030" y="314370"/>
             <a:ext cx="3545173" cy="646331"/>
           </a:xfrm>
           <a:prstGeom prst="rect">
@@ -4649,7 +4805,7 @@
         </p:nvSpPr>
         <p:spPr>
           <a:xfrm>
-            <a:off x="689548" y="1379095"/>
+            <a:off x="743397" y="2315492"/>
             <a:ext cx="5996065" cy="1266669"/>
           </a:xfrm>
           <a:prstGeom prst="roundRect">
@@ -4787,7 +4943,7 @@
         </p:nvSpPr>
         <p:spPr>
           <a:xfrm>
-            <a:off x="1534761" y="2170331"/>
+            <a:off x="1230899" y="3186301"/>
             <a:ext cx="252000" cy="253079"/>
           </a:xfrm>
           <a:prstGeom prst="ellipse">
@@ -4818,7 +4974,7 @@
           <a:lstStyle/>
           <a:p>
             <a:pPr algn="ctr"/>
-            <a:endParaRPr lang="en-GB"/>
+            <a:endParaRPr lang="en-GB" dirty="0"/>
           </a:p>
         </p:txBody>
       </p:sp>
@@ -4836,7 +4992,7 @@
         </p:nvSpPr>
         <p:spPr>
           <a:xfrm>
-            <a:off x="2803461" y="2181121"/>
+            <a:off x="2749747" y="3182874"/>
             <a:ext cx="252000" cy="253079"/>
           </a:xfrm>
           <a:prstGeom prst="ellipse">
@@ -4885,7 +5041,7 @@
         </p:nvSpPr>
         <p:spPr>
           <a:xfrm>
-            <a:off x="5617251" y="2170331"/>
+            <a:off x="5652663" y="3189865"/>
             <a:ext cx="252000" cy="253079"/>
           </a:xfrm>
           <a:prstGeom prst="ellipse">
@@ -4934,7 +5090,7 @@
         </p:nvSpPr>
         <p:spPr>
           <a:xfrm>
-            <a:off x="2821898" y="1373353"/>
+            <a:off x="2875747" y="2309750"/>
             <a:ext cx="1731364" cy="400110"/>
           </a:xfrm>
           <a:prstGeom prst="rect">
@@ -4970,7 +5126,7 @@
         </p:nvSpPr>
         <p:spPr>
           <a:xfrm>
-            <a:off x="1196065" y="1800999"/>
+            <a:off x="892203" y="2816969"/>
             <a:ext cx="1004341" cy="369332"/>
           </a:xfrm>
           <a:prstGeom prst="rect">
@@ -5006,7 +5162,7 @@
         </p:nvSpPr>
         <p:spPr>
           <a:xfrm>
-            <a:off x="2407747" y="1833396"/>
+            <a:off x="2354033" y="2835149"/>
             <a:ext cx="1004341" cy="369332"/>
           </a:xfrm>
           <a:prstGeom prst="rect">
@@ -5042,7 +5198,7 @@
         </p:nvSpPr>
         <p:spPr>
           <a:xfrm>
-            <a:off x="5202371" y="1573408"/>
+            <a:off x="5237783" y="2592942"/>
             <a:ext cx="1182522" cy="646331"/>
           </a:xfrm>
           <a:prstGeom prst="rect">
@@ -5078,8 +5234,8 @@
         </p:nvSpPr>
         <p:spPr>
           <a:xfrm>
-            <a:off x="744032" y="3127948"/>
-            <a:ext cx="5996065" cy="1266669"/>
+            <a:off x="744032" y="3910813"/>
+            <a:ext cx="5996065" cy="1195315"/>
           </a:xfrm>
           <a:prstGeom prst="roundRect">
             <a:avLst/>
@@ -5124,7 +5280,7 @@
         </p:nvSpPr>
         <p:spPr>
           <a:xfrm>
-            <a:off x="1589245" y="3919184"/>
+            <a:off x="1231534" y="4710268"/>
             <a:ext cx="252000" cy="253079"/>
           </a:xfrm>
           <a:prstGeom prst="ellipse">
@@ -5173,7 +5329,7 @@
         </p:nvSpPr>
         <p:spPr>
           <a:xfrm>
-            <a:off x="2835664" y="3922877"/>
+            <a:off x="2697143" y="4708541"/>
             <a:ext cx="252000" cy="253079"/>
           </a:xfrm>
           <a:prstGeom prst="ellipse">
@@ -5210,10 +5366,154 @@
       </p:sp>
       <p:sp>
         <p:nvSpPr>
-          <p:cNvPr id="21" name="Oval 20">
-            <a:extLst>
-              <a:ext uri="{FF2B5EF4-FFF2-40B4-BE49-F238E27FC236}">
-                <a16:creationId xmlns:a16="http://schemas.microsoft.com/office/drawing/2014/main" id="{A1DAA4B6-EA1C-4736-9E85-D1581A9D4FBB}"/>
+          <p:cNvPr id="22" name="TextBox 21">
+            <a:extLst>
+              <a:ext uri="{FF2B5EF4-FFF2-40B4-BE49-F238E27FC236}">
+                <a16:creationId xmlns:a16="http://schemas.microsoft.com/office/drawing/2014/main" id="{4630DFCA-4294-4E68-ACB7-DE6BE27E1AE7}"/>
+              </a:ext>
+            </a:extLst>
+          </p:cNvPr>
+          <p:cNvSpPr txBox="1"/>
+          <p:nvPr/>
+        </p:nvSpPr>
+        <p:spPr>
+          <a:xfrm>
+            <a:off x="2821898" y="3960706"/>
+            <a:ext cx="1731364" cy="400110"/>
+          </a:xfrm>
+          <a:prstGeom prst="rect">
+            <a:avLst/>
+          </a:prstGeom>
+          <a:noFill/>
+        </p:spPr>
+        <p:txBody>
+          <a:bodyPr wrap="square" rtlCol="0">
+            <a:spAutoFit/>
+          </a:bodyPr>
+          <a:lstStyle/>
+          <a:p>
+            <a:pPr algn="ctr"/>
+            <a:r>
+              <a:rPr lang="en-GB" sz="2000" b="1" dirty="0"/>
+              <a:t>Ethnicity</a:t>
+            </a:r>
+          </a:p>
+        </p:txBody>
+      </p:sp>
+      <p:sp>
+        <p:nvSpPr>
+          <p:cNvPr id="23" name="TextBox 22">
+            <a:extLst>
+              <a:ext uri="{FF2B5EF4-FFF2-40B4-BE49-F238E27FC236}">
+                <a16:creationId xmlns:a16="http://schemas.microsoft.com/office/drawing/2014/main" id="{5526A7E5-FCAC-496A-AA0C-EA2C88D9F06C}"/>
+              </a:ext>
+            </a:extLst>
+          </p:cNvPr>
+          <p:cNvSpPr txBox="1"/>
+          <p:nvPr/>
+        </p:nvSpPr>
+        <p:spPr>
+          <a:xfrm>
+            <a:off x="892838" y="4340936"/>
+            <a:ext cx="1004341" cy="369332"/>
+          </a:xfrm>
+          <a:prstGeom prst="rect">
+            <a:avLst/>
+          </a:prstGeom>
+          <a:noFill/>
+        </p:spPr>
+        <p:txBody>
+          <a:bodyPr wrap="square" rtlCol="0">
+            <a:spAutoFit/>
+          </a:bodyPr>
+          <a:lstStyle/>
+          <a:p>
+            <a:pPr algn="ctr"/>
+            <a:r>
+              <a:rPr lang="en-GB" dirty="0"/>
+              <a:t>White</a:t>
+            </a:r>
+          </a:p>
+        </p:txBody>
+      </p:sp>
+      <p:sp>
+        <p:nvSpPr>
+          <p:cNvPr id="24" name="TextBox 23">
+            <a:extLst>
+              <a:ext uri="{FF2B5EF4-FFF2-40B4-BE49-F238E27FC236}">
+                <a16:creationId xmlns:a16="http://schemas.microsoft.com/office/drawing/2014/main" id="{E965BD98-80BB-462F-893D-D3D3C4E153FA}"/>
+              </a:ext>
+            </a:extLst>
+          </p:cNvPr>
+          <p:cNvSpPr txBox="1"/>
+          <p:nvPr/>
+        </p:nvSpPr>
+        <p:spPr>
+          <a:xfrm>
+            <a:off x="2301429" y="4360816"/>
+            <a:ext cx="1004341" cy="369332"/>
+          </a:xfrm>
+          <a:prstGeom prst="rect">
+            <a:avLst/>
+          </a:prstGeom>
+          <a:noFill/>
+        </p:spPr>
+        <p:txBody>
+          <a:bodyPr wrap="square" rtlCol="0">
+            <a:spAutoFit/>
+          </a:bodyPr>
+          <a:lstStyle/>
+          <a:p>
+            <a:pPr algn="ctr"/>
+            <a:r>
+              <a:rPr lang="en-GB" dirty="0"/>
+              <a:t>Black</a:t>
+            </a:r>
+          </a:p>
+        </p:txBody>
+      </p:sp>
+      <p:sp>
+        <p:nvSpPr>
+          <p:cNvPr id="25" name="TextBox 24">
+            <a:extLst>
+              <a:ext uri="{FF2B5EF4-FFF2-40B4-BE49-F238E27FC236}">
+                <a16:creationId xmlns:a16="http://schemas.microsoft.com/office/drawing/2014/main" id="{11A8624C-DDCA-4F8F-8D16-C46630390FB5}"/>
+              </a:ext>
+            </a:extLst>
+          </p:cNvPr>
+          <p:cNvSpPr txBox="1"/>
+          <p:nvPr/>
+        </p:nvSpPr>
+        <p:spPr>
+          <a:xfrm>
+            <a:off x="5176011" y="4129477"/>
+            <a:ext cx="1182522" cy="646331"/>
+          </a:xfrm>
+          <a:prstGeom prst="rect">
+            <a:avLst/>
+          </a:prstGeom>
+          <a:noFill/>
+        </p:spPr>
+        <p:txBody>
+          <a:bodyPr wrap="square" rtlCol="0">
+            <a:spAutoFit/>
+          </a:bodyPr>
+          <a:lstStyle/>
+          <a:p>
+            <a:pPr algn="ctr"/>
+            <a:r>
+              <a:rPr lang="en-GB" dirty="0"/>
+              <a:t>Preferer not to say</a:t>
+            </a:r>
+          </a:p>
+        </p:txBody>
+      </p:sp>
+      <p:sp>
+        <p:nvSpPr>
+          <p:cNvPr id="26" name="Oval 25">
+            <a:extLst>
+              <a:ext uri="{FF2B5EF4-FFF2-40B4-BE49-F238E27FC236}">
+                <a16:creationId xmlns:a16="http://schemas.microsoft.com/office/drawing/2014/main" id="{BD51485C-E5BA-4603-9DF0-622BB6831F86}"/>
               </a:ext>
             </a:extLst>
           </p:cNvPr>
@@ -5222,7 +5522,7 @@
         </p:nvSpPr>
         <p:spPr>
           <a:xfrm>
-            <a:off x="5671735" y="3919184"/>
+            <a:off x="4137144" y="4640855"/>
             <a:ext cx="252000" cy="253079"/>
           </a:xfrm>
           <a:prstGeom prst="ellipse">
@@ -5259,10 +5559,10 @@
       </p:sp>
       <p:sp>
         <p:nvSpPr>
-          <p:cNvPr id="22" name="TextBox 21">
-            <a:extLst>
-              <a:ext uri="{FF2B5EF4-FFF2-40B4-BE49-F238E27FC236}">
-                <a16:creationId xmlns:a16="http://schemas.microsoft.com/office/drawing/2014/main" id="{4630DFCA-4294-4E68-ACB7-DE6BE27E1AE7}"/>
+          <p:cNvPr id="27" name="TextBox 26">
+            <a:extLst>
+              <a:ext uri="{FF2B5EF4-FFF2-40B4-BE49-F238E27FC236}">
+                <a16:creationId xmlns:a16="http://schemas.microsoft.com/office/drawing/2014/main" id="{333B95B6-6DA4-4ECD-847D-79A1EE77DFDD}"/>
               </a:ext>
             </a:extLst>
           </p:cNvPr>
@@ -5271,8 +5571,8 @@
         </p:nvSpPr>
         <p:spPr>
           <a:xfrm>
-            <a:off x="2876382" y="3122206"/>
-            <a:ext cx="1731364" cy="400110"/>
+            <a:off x="3741430" y="4293130"/>
+            <a:ext cx="1004341" cy="369332"/>
           </a:xfrm>
           <a:prstGeom prst="rect">
             <a:avLst/>
@@ -5287,18 +5587,211 @@
           <a:p>
             <a:pPr algn="ctr"/>
             <a:r>
-              <a:rPr lang="en-GB" sz="2000" b="1" dirty="0"/>
-              <a:t>Ethnicity</a:t>
+              <a:rPr lang="en-GB" dirty="0"/>
+              <a:t>Asian</a:t>
             </a:r>
           </a:p>
         </p:txBody>
       </p:sp>
       <p:sp>
         <p:nvSpPr>
-          <p:cNvPr id="23" name="TextBox 22">
-            <a:extLst>
-              <a:ext uri="{FF2B5EF4-FFF2-40B4-BE49-F238E27FC236}">
-                <a16:creationId xmlns:a16="http://schemas.microsoft.com/office/drawing/2014/main" id="{5526A7E5-FCAC-496A-AA0C-EA2C88D9F06C}"/>
+          <p:cNvPr id="28" name="Rectangle: Rounded Corners 27">
+            <a:extLst>
+              <a:ext uri="{FF2B5EF4-FFF2-40B4-BE49-F238E27FC236}">
+                <a16:creationId xmlns:a16="http://schemas.microsoft.com/office/drawing/2014/main" id="{F5E18529-87A0-4E1A-A9CF-E15CCAF97A68}"/>
+              </a:ext>
+            </a:extLst>
+          </p:cNvPr>
+          <p:cNvSpPr/>
+          <p:nvPr/>
+        </p:nvSpPr>
+        <p:spPr>
+          <a:xfrm>
+            <a:off x="689548" y="5479184"/>
+            <a:ext cx="5996065" cy="1195940"/>
+          </a:xfrm>
+          <a:prstGeom prst="roundRect">
+            <a:avLst/>
+          </a:prstGeom>
+        </p:spPr>
+        <p:style>
+          <a:lnRef idx="2">
+            <a:schemeClr val="accent2">
+              <a:shade val="50000"/>
+            </a:schemeClr>
+          </a:lnRef>
+          <a:fillRef idx="1">
+            <a:schemeClr val="accent2"/>
+          </a:fillRef>
+          <a:effectRef idx="0">
+            <a:schemeClr val="accent2"/>
+          </a:effectRef>
+          <a:fontRef idx="minor">
+            <a:schemeClr val="lt1"/>
+          </a:fontRef>
+        </p:style>
+        <p:txBody>
+          <a:bodyPr rtlCol="0" anchor="ctr"/>
+          <a:lstStyle/>
+          <a:p>
+            <a:pPr algn="ctr"/>
+            <a:endParaRPr lang="en-GB"/>
+          </a:p>
+        </p:txBody>
+      </p:sp>
+      <p:sp>
+        <p:nvSpPr>
+          <p:cNvPr id="29" name="Oval 28">
+            <a:extLst>
+              <a:ext uri="{FF2B5EF4-FFF2-40B4-BE49-F238E27FC236}">
+                <a16:creationId xmlns:a16="http://schemas.microsoft.com/office/drawing/2014/main" id="{45B05D2E-803E-4AFE-9C95-3D0A0400442C}"/>
+              </a:ext>
+            </a:extLst>
+          </p:cNvPr>
+          <p:cNvSpPr/>
+          <p:nvPr/>
+        </p:nvSpPr>
+        <p:spPr>
+          <a:xfrm>
+            <a:off x="1177050" y="6279264"/>
+            <a:ext cx="252000" cy="253079"/>
+          </a:xfrm>
+          <a:prstGeom prst="ellipse">
+            <a:avLst/>
+          </a:prstGeom>
+          <a:solidFill>
+            <a:schemeClr val="bg1"/>
+          </a:solidFill>
+        </p:spPr>
+        <p:style>
+          <a:lnRef idx="2">
+            <a:schemeClr val="dk1">
+              <a:shade val="50000"/>
+            </a:schemeClr>
+          </a:lnRef>
+          <a:fillRef idx="1">
+            <a:schemeClr val="dk1"/>
+          </a:fillRef>
+          <a:effectRef idx="0">
+            <a:schemeClr val="dk1"/>
+          </a:effectRef>
+          <a:fontRef idx="minor">
+            <a:schemeClr val="lt1"/>
+          </a:fontRef>
+        </p:style>
+        <p:txBody>
+          <a:bodyPr rtlCol="0" anchor="ctr"/>
+          <a:lstStyle/>
+          <a:p>
+            <a:pPr algn="ctr"/>
+            <a:endParaRPr lang="en-GB"/>
+          </a:p>
+        </p:txBody>
+      </p:sp>
+      <p:sp>
+        <p:nvSpPr>
+          <p:cNvPr id="30" name="Oval 29">
+            <a:extLst>
+              <a:ext uri="{FF2B5EF4-FFF2-40B4-BE49-F238E27FC236}">
+                <a16:creationId xmlns:a16="http://schemas.microsoft.com/office/drawing/2014/main" id="{0ECAFB55-7BD5-47B8-BC3C-909DC41E38E9}"/>
+              </a:ext>
+            </a:extLst>
+          </p:cNvPr>
+          <p:cNvSpPr/>
+          <p:nvPr/>
+        </p:nvSpPr>
+        <p:spPr>
+          <a:xfrm>
+            <a:off x="2195027" y="6249099"/>
+            <a:ext cx="252000" cy="253079"/>
+          </a:xfrm>
+          <a:prstGeom prst="ellipse">
+            <a:avLst/>
+          </a:prstGeom>
+          <a:solidFill>
+            <a:schemeClr val="bg1"/>
+          </a:solidFill>
+        </p:spPr>
+        <p:style>
+          <a:lnRef idx="2">
+            <a:schemeClr val="dk1">
+              <a:shade val="50000"/>
+            </a:schemeClr>
+          </a:lnRef>
+          <a:fillRef idx="1">
+            <a:schemeClr val="dk1"/>
+          </a:fillRef>
+          <a:effectRef idx="0">
+            <a:schemeClr val="dk1"/>
+          </a:effectRef>
+          <a:fontRef idx="minor">
+            <a:schemeClr val="lt1"/>
+          </a:fontRef>
+        </p:style>
+        <p:txBody>
+          <a:bodyPr rtlCol="0" anchor="ctr"/>
+          <a:lstStyle/>
+          <a:p>
+            <a:pPr algn="ctr"/>
+            <a:endParaRPr lang="en-GB"/>
+          </a:p>
+        </p:txBody>
+      </p:sp>
+      <p:sp>
+        <p:nvSpPr>
+          <p:cNvPr id="31" name="Oval 30">
+            <a:extLst>
+              <a:ext uri="{FF2B5EF4-FFF2-40B4-BE49-F238E27FC236}">
+                <a16:creationId xmlns:a16="http://schemas.microsoft.com/office/drawing/2014/main" id="{754DF105-7BD8-426D-977C-3F4DA0544215}"/>
+              </a:ext>
+            </a:extLst>
+          </p:cNvPr>
+          <p:cNvSpPr/>
+          <p:nvPr/>
+        </p:nvSpPr>
+        <p:spPr>
+          <a:xfrm>
+            <a:off x="5617251" y="6199691"/>
+            <a:ext cx="252000" cy="253079"/>
+          </a:xfrm>
+          <a:prstGeom prst="ellipse">
+            <a:avLst/>
+          </a:prstGeom>
+          <a:solidFill>
+            <a:schemeClr val="bg1"/>
+          </a:solidFill>
+        </p:spPr>
+        <p:style>
+          <a:lnRef idx="2">
+            <a:schemeClr val="dk1">
+              <a:shade val="50000"/>
+            </a:schemeClr>
+          </a:lnRef>
+          <a:fillRef idx="1">
+            <a:schemeClr val="dk1"/>
+          </a:fillRef>
+          <a:effectRef idx="0">
+            <a:schemeClr val="dk1"/>
+          </a:effectRef>
+          <a:fontRef idx="minor">
+            <a:schemeClr val="lt1"/>
+          </a:fontRef>
+        </p:style>
+        <p:txBody>
+          <a:bodyPr rtlCol="0" anchor="ctr"/>
+          <a:lstStyle/>
+          <a:p>
+            <a:pPr algn="ctr"/>
+            <a:endParaRPr lang="en-GB"/>
+          </a:p>
+        </p:txBody>
+      </p:sp>
+      <p:sp>
+        <p:nvSpPr>
+          <p:cNvPr id="32" name="TextBox 31">
+            <a:extLst>
+              <a:ext uri="{FF2B5EF4-FFF2-40B4-BE49-F238E27FC236}">
+                <a16:creationId xmlns:a16="http://schemas.microsoft.com/office/drawing/2014/main" id="{1154A125-1823-4755-81F9-FEF3B651AB5F}"/>
               </a:ext>
             </a:extLst>
           </p:cNvPr>
@@ -5307,8 +5800,8 @@
         </p:nvSpPr>
         <p:spPr>
           <a:xfrm>
-            <a:off x="1250549" y="3549852"/>
-            <a:ext cx="1004341" cy="369332"/>
+            <a:off x="2821898" y="5492706"/>
+            <a:ext cx="1731364" cy="400110"/>
           </a:xfrm>
           <a:prstGeom prst="rect">
             <a:avLst/>
@@ -5323,18 +5816,18 @@
           <a:p>
             <a:pPr algn="ctr"/>
             <a:r>
-              <a:rPr lang="en-GB" dirty="0"/>
-              <a:t>White</a:t>
+              <a:rPr lang="en-GB" sz="2000" b="1" dirty="0"/>
+              <a:t>Age Group</a:t>
             </a:r>
           </a:p>
         </p:txBody>
       </p:sp>
       <p:sp>
         <p:nvSpPr>
-          <p:cNvPr id="24" name="TextBox 23">
-            <a:extLst>
-              <a:ext uri="{FF2B5EF4-FFF2-40B4-BE49-F238E27FC236}">
-                <a16:creationId xmlns:a16="http://schemas.microsoft.com/office/drawing/2014/main" id="{E965BD98-80BB-462F-893D-D3D3C4E153FA}"/>
+          <p:cNvPr id="33" name="TextBox 32">
+            <a:extLst>
+              <a:ext uri="{FF2B5EF4-FFF2-40B4-BE49-F238E27FC236}">
+                <a16:creationId xmlns:a16="http://schemas.microsoft.com/office/drawing/2014/main" id="{6B1B07F7-CC58-43FC-AC13-A2B762AAB5D3}"/>
               </a:ext>
             </a:extLst>
           </p:cNvPr>
@@ -5343,7 +5836,7 @@
         </p:nvSpPr>
         <p:spPr>
           <a:xfrm>
-            <a:off x="2439950" y="3575152"/>
+            <a:off x="838354" y="5909932"/>
             <a:ext cx="1004341" cy="369332"/>
           </a:xfrm>
           <a:prstGeom prst="rect">
@@ -5360,17 +5853,17 @@
             <a:pPr algn="ctr"/>
             <a:r>
               <a:rPr lang="en-GB" dirty="0"/>
-              <a:t>Black</a:t>
+              <a:t>Child</a:t>
             </a:r>
           </a:p>
         </p:txBody>
       </p:sp>
       <p:sp>
         <p:nvSpPr>
-          <p:cNvPr id="25" name="TextBox 24">
-            <a:extLst>
-              <a:ext uri="{FF2B5EF4-FFF2-40B4-BE49-F238E27FC236}">
-                <a16:creationId xmlns:a16="http://schemas.microsoft.com/office/drawing/2014/main" id="{11A8624C-DDCA-4F8F-8D16-C46630390FB5}"/>
+          <p:cNvPr id="34" name="TextBox 33">
+            <a:extLst>
+              <a:ext uri="{FF2B5EF4-FFF2-40B4-BE49-F238E27FC236}">
+                <a16:creationId xmlns:a16="http://schemas.microsoft.com/office/drawing/2014/main" id="{C1C55292-D52D-4B39-B60C-F40A29B31F25}"/>
               </a:ext>
             </a:extLst>
           </p:cNvPr>
@@ -5379,7 +5872,43 @@
         </p:nvSpPr>
         <p:spPr>
           <a:xfrm>
-            <a:off x="5256855" y="3322261"/>
+            <a:off x="1799313" y="5901374"/>
+            <a:ext cx="1054844" cy="369332"/>
+          </a:xfrm>
+          <a:prstGeom prst="rect">
+            <a:avLst/>
+          </a:prstGeom>
+          <a:noFill/>
+        </p:spPr>
+        <p:txBody>
+          <a:bodyPr wrap="square" rtlCol="0">
+            <a:spAutoFit/>
+          </a:bodyPr>
+          <a:lstStyle/>
+          <a:p>
+            <a:pPr algn="ctr"/>
+            <a:r>
+              <a:rPr lang="en-GB" dirty="0"/>
+              <a:t>Teenager</a:t>
+            </a:r>
+          </a:p>
+        </p:txBody>
+      </p:sp>
+      <p:sp>
+        <p:nvSpPr>
+          <p:cNvPr id="35" name="TextBox 34">
+            <a:extLst>
+              <a:ext uri="{FF2B5EF4-FFF2-40B4-BE49-F238E27FC236}">
+                <a16:creationId xmlns:a16="http://schemas.microsoft.com/office/drawing/2014/main" id="{9BDE626D-F348-4959-B48D-E2C83847A1D5}"/>
+              </a:ext>
+            </a:extLst>
+          </p:cNvPr>
+          <p:cNvSpPr txBox="1"/>
+          <p:nvPr/>
+        </p:nvSpPr>
+        <p:spPr>
+          <a:xfrm>
+            <a:off x="5202371" y="5602768"/>
             <a:ext cx="1182522" cy="646331"/>
           </a:xfrm>
           <a:prstGeom prst="rect">
@@ -5403,10 +5932,10 @@
       </p:sp>
       <p:sp>
         <p:nvSpPr>
-          <p:cNvPr id="26" name="Oval 25">
-            <a:extLst>
-              <a:ext uri="{FF2B5EF4-FFF2-40B4-BE49-F238E27FC236}">
-                <a16:creationId xmlns:a16="http://schemas.microsoft.com/office/drawing/2014/main" id="{BD51485C-E5BA-4603-9DF0-622BB6831F86}"/>
+          <p:cNvPr id="36" name="Oval 35">
+            <a:extLst>
+              <a:ext uri="{FF2B5EF4-FFF2-40B4-BE49-F238E27FC236}">
+                <a16:creationId xmlns:a16="http://schemas.microsoft.com/office/drawing/2014/main" id="{61A487DC-A893-40C3-8268-2D0F1816ED71}"/>
               </a:ext>
             </a:extLst>
           </p:cNvPr>
@@ -5415,7 +5944,7 @@
         </p:nvSpPr>
         <p:spPr>
           <a:xfrm>
-            <a:off x="4406150" y="3922877"/>
+            <a:off x="3429161" y="6259939"/>
             <a:ext cx="252000" cy="253079"/>
           </a:xfrm>
           <a:prstGeom prst="ellipse">
@@ -5452,10 +5981,10 @@
       </p:sp>
       <p:sp>
         <p:nvSpPr>
-          <p:cNvPr id="27" name="TextBox 26">
-            <a:extLst>
-              <a:ext uri="{FF2B5EF4-FFF2-40B4-BE49-F238E27FC236}">
-                <a16:creationId xmlns:a16="http://schemas.microsoft.com/office/drawing/2014/main" id="{333B95B6-6DA4-4ECD-847D-79A1EE77DFDD}"/>
+          <p:cNvPr id="37" name="TextBox 36">
+            <a:extLst>
+              <a:ext uri="{FF2B5EF4-FFF2-40B4-BE49-F238E27FC236}">
+                <a16:creationId xmlns:a16="http://schemas.microsoft.com/office/drawing/2014/main" id="{BFE317C3-5F1C-46E3-BB75-804ED2A9E706}"/>
               </a:ext>
             </a:extLst>
           </p:cNvPr>
@@ -5464,7 +5993,7 @@
         </p:nvSpPr>
         <p:spPr>
           <a:xfrm>
-            <a:off x="4010436" y="3575152"/>
+            <a:off x="3033447" y="5912214"/>
             <a:ext cx="1004341" cy="369332"/>
           </a:xfrm>
           <a:prstGeom prst="rect">
@@ -5481,17 +6010,17 @@
             <a:pPr algn="ctr"/>
             <a:r>
               <a:rPr lang="en-GB" dirty="0"/>
-              <a:t>Asian</a:t>
+              <a:t>Adult</a:t>
             </a:r>
           </a:p>
         </p:txBody>
       </p:sp>
       <p:sp>
         <p:nvSpPr>
-          <p:cNvPr id="28" name="Rectangle: Rounded Corners 27">
-            <a:extLst>
-              <a:ext uri="{FF2B5EF4-FFF2-40B4-BE49-F238E27FC236}">
-                <a16:creationId xmlns:a16="http://schemas.microsoft.com/office/drawing/2014/main" id="{F5E18529-87A0-4E1A-A9CF-E15CCAF97A68}"/>
+          <p:cNvPr id="38" name="Oval 37">
+            <a:extLst>
+              <a:ext uri="{FF2B5EF4-FFF2-40B4-BE49-F238E27FC236}">
+                <a16:creationId xmlns:a16="http://schemas.microsoft.com/office/drawing/2014/main" id="{24917541-EE29-4829-92EE-2965344DACCC}"/>
               </a:ext>
             </a:extLst>
           </p:cNvPr>
@@ -5500,8 +6029,93 @@
         </p:nvSpPr>
         <p:spPr>
           <a:xfrm>
-            <a:off x="671111" y="4880920"/>
-            <a:ext cx="5996065" cy="1266669"/>
+            <a:off x="4746694" y="6258829"/>
+            <a:ext cx="252000" cy="253079"/>
+          </a:xfrm>
+          <a:prstGeom prst="ellipse">
+            <a:avLst/>
+          </a:prstGeom>
+          <a:solidFill>
+            <a:schemeClr val="bg1"/>
+          </a:solidFill>
+        </p:spPr>
+        <p:style>
+          <a:lnRef idx="2">
+            <a:schemeClr val="dk1">
+              <a:shade val="50000"/>
+            </a:schemeClr>
+          </a:lnRef>
+          <a:fillRef idx="1">
+            <a:schemeClr val="dk1"/>
+          </a:fillRef>
+          <a:effectRef idx="0">
+            <a:schemeClr val="dk1"/>
+          </a:effectRef>
+          <a:fontRef idx="minor">
+            <a:schemeClr val="lt1"/>
+          </a:fontRef>
+        </p:style>
+        <p:txBody>
+          <a:bodyPr rtlCol="0" anchor="ctr"/>
+          <a:lstStyle/>
+          <a:p>
+            <a:pPr algn="ctr"/>
+            <a:endParaRPr lang="en-GB"/>
+          </a:p>
+        </p:txBody>
+      </p:sp>
+      <p:sp>
+        <p:nvSpPr>
+          <p:cNvPr id="39" name="TextBox 38">
+            <a:extLst>
+              <a:ext uri="{FF2B5EF4-FFF2-40B4-BE49-F238E27FC236}">
+                <a16:creationId xmlns:a16="http://schemas.microsoft.com/office/drawing/2014/main" id="{434702F6-99DB-4DE1-A8F9-5F0155DB6386}"/>
+              </a:ext>
+            </a:extLst>
+          </p:cNvPr>
+          <p:cNvSpPr txBox="1"/>
+          <p:nvPr/>
+        </p:nvSpPr>
+        <p:spPr>
+          <a:xfrm>
+            <a:off x="4350980" y="5911104"/>
+            <a:ext cx="1004341" cy="369332"/>
+          </a:xfrm>
+          <a:prstGeom prst="rect">
+            <a:avLst/>
+          </a:prstGeom>
+          <a:noFill/>
+        </p:spPr>
+        <p:txBody>
+          <a:bodyPr wrap="square" rtlCol="0">
+            <a:spAutoFit/>
+          </a:bodyPr>
+          <a:lstStyle/>
+          <a:p>
+            <a:pPr algn="ctr"/>
+            <a:r>
+              <a:rPr lang="en-GB" dirty="0"/>
+              <a:t>Old</a:t>
+            </a:r>
+          </a:p>
+        </p:txBody>
+      </p:sp>
+      <p:sp>
+        <p:nvSpPr>
+          <p:cNvPr id="53" name="Rectangle: Rounded Corners 52">
+            <a:extLst>
+              <a:ext uri="{FF2B5EF4-FFF2-40B4-BE49-F238E27FC236}">
+                <a16:creationId xmlns:a16="http://schemas.microsoft.com/office/drawing/2014/main" id="{0ADEB49C-016F-4676-88D1-8633C9240A6A}"/>
+              </a:ext>
+            </a:extLst>
+          </p:cNvPr>
+          <p:cNvSpPr/>
+          <p:nvPr/>
+        </p:nvSpPr>
+        <p:spPr>
+          <a:xfrm>
+            <a:off x="744032" y="7084360"/>
+            <a:ext cx="5996065" cy="1113496"/>
           </a:xfrm>
           <a:prstGeom prst="roundRect">
             <a:avLst/>
@@ -5534,10 +6148,10 @@
       </p:sp>
       <p:sp>
         <p:nvSpPr>
-          <p:cNvPr id="29" name="Oval 28">
-            <a:extLst>
-              <a:ext uri="{FF2B5EF4-FFF2-40B4-BE49-F238E27FC236}">
-                <a16:creationId xmlns:a16="http://schemas.microsoft.com/office/drawing/2014/main" id="{45B05D2E-803E-4AFE-9C95-3D0A0400442C}"/>
+          <p:cNvPr id="56" name="Oval 55">
+            <a:extLst>
+              <a:ext uri="{FF2B5EF4-FFF2-40B4-BE49-F238E27FC236}">
+                <a16:creationId xmlns:a16="http://schemas.microsoft.com/office/drawing/2014/main" id="{17DC1A83-84C4-44FA-9470-37751A1F9D60}"/>
               </a:ext>
             </a:extLst>
           </p:cNvPr>
@@ -5546,7 +6160,7 @@
         </p:nvSpPr>
         <p:spPr>
           <a:xfrm>
-            <a:off x="1516324" y="5672156"/>
+            <a:off x="5671735" y="7797057"/>
             <a:ext cx="252000" cy="253079"/>
           </a:xfrm>
           <a:prstGeom prst="ellipse">
@@ -5583,108 +6197,10 @@
       </p:sp>
       <p:sp>
         <p:nvSpPr>
-          <p:cNvPr id="30" name="Oval 29">
-            <a:extLst>
-              <a:ext uri="{FF2B5EF4-FFF2-40B4-BE49-F238E27FC236}">
-                <a16:creationId xmlns:a16="http://schemas.microsoft.com/office/drawing/2014/main" id="{0ECAFB55-7BD5-47B8-BC3C-909DC41E38E9}"/>
-              </a:ext>
-            </a:extLst>
-          </p:cNvPr>
-          <p:cNvSpPr/>
-          <p:nvPr/>
-        </p:nvSpPr>
-        <p:spPr>
-          <a:xfrm>
-            <a:off x="2762743" y="5675849"/>
-            <a:ext cx="252000" cy="253079"/>
-          </a:xfrm>
-          <a:prstGeom prst="ellipse">
-            <a:avLst/>
-          </a:prstGeom>
-          <a:solidFill>
-            <a:schemeClr val="bg1"/>
-          </a:solidFill>
-        </p:spPr>
-        <p:style>
-          <a:lnRef idx="2">
-            <a:schemeClr val="dk1">
-              <a:shade val="50000"/>
-            </a:schemeClr>
-          </a:lnRef>
-          <a:fillRef idx="1">
-            <a:schemeClr val="dk1"/>
-          </a:fillRef>
-          <a:effectRef idx="0">
-            <a:schemeClr val="dk1"/>
-          </a:effectRef>
-          <a:fontRef idx="minor">
-            <a:schemeClr val="lt1"/>
-          </a:fontRef>
-        </p:style>
-        <p:txBody>
-          <a:bodyPr rtlCol="0" anchor="ctr"/>
-          <a:lstStyle/>
-          <a:p>
-            <a:pPr algn="ctr"/>
-            <a:endParaRPr lang="en-GB"/>
-          </a:p>
-        </p:txBody>
-      </p:sp>
-      <p:sp>
-        <p:nvSpPr>
-          <p:cNvPr id="31" name="Oval 30">
-            <a:extLst>
-              <a:ext uri="{FF2B5EF4-FFF2-40B4-BE49-F238E27FC236}">
-                <a16:creationId xmlns:a16="http://schemas.microsoft.com/office/drawing/2014/main" id="{754DF105-7BD8-426D-977C-3F4DA0544215}"/>
-              </a:ext>
-            </a:extLst>
-          </p:cNvPr>
-          <p:cNvSpPr/>
-          <p:nvPr/>
-        </p:nvSpPr>
-        <p:spPr>
-          <a:xfrm>
-            <a:off x="5598814" y="5672156"/>
-            <a:ext cx="252000" cy="253079"/>
-          </a:xfrm>
-          <a:prstGeom prst="ellipse">
-            <a:avLst/>
-          </a:prstGeom>
-          <a:solidFill>
-            <a:schemeClr val="bg1"/>
-          </a:solidFill>
-        </p:spPr>
-        <p:style>
-          <a:lnRef idx="2">
-            <a:schemeClr val="dk1">
-              <a:shade val="50000"/>
-            </a:schemeClr>
-          </a:lnRef>
-          <a:fillRef idx="1">
-            <a:schemeClr val="dk1"/>
-          </a:fillRef>
-          <a:effectRef idx="0">
-            <a:schemeClr val="dk1"/>
-          </a:effectRef>
-          <a:fontRef idx="minor">
-            <a:schemeClr val="lt1"/>
-          </a:fontRef>
-        </p:style>
-        <p:txBody>
-          <a:bodyPr rtlCol="0" anchor="ctr"/>
-          <a:lstStyle/>
-          <a:p>
-            <a:pPr algn="ctr"/>
-            <a:endParaRPr lang="en-GB"/>
-          </a:p>
-        </p:txBody>
-      </p:sp>
-      <p:sp>
-        <p:nvSpPr>
-          <p:cNvPr id="32" name="TextBox 31">
-            <a:extLst>
-              <a:ext uri="{FF2B5EF4-FFF2-40B4-BE49-F238E27FC236}">
-                <a16:creationId xmlns:a16="http://schemas.microsoft.com/office/drawing/2014/main" id="{1154A125-1823-4755-81F9-FEF3B651AB5F}"/>
+          <p:cNvPr id="57" name="TextBox 56">
+            <a:extLst>
+              <a:ext uri="{FF2B5EF4-FFF2-40B4-BE49-F238E27FC236}">
+                <a16:creationId xmlns:a16="http://schemas.microsoft.com/office/drawing/2014/main" id="{C03038FD-42F4-4F4B-A991-18E1D3490EDB}"/>
               </a:ext>
             </a:extLst>
           </p:cNvPr>
@@ -5693,7 +6209,7 @@
         </p:nvSpPr>
         <p:spPr>
           <a:xfrm>
-            <a:off x="2803461" y="4875178"/>
+            <a:off x="2818157" y="7071006"/>
             <a:ext cx="1731364" cy="400110"/>
           </a:xfrm>
           <a:prstGeom prst="rect">
@@ -5710,17 +6226,17 @@
             <a:pPr algn="ctr"/>
             <a:r>
               <a:rPr lang="en-GB" sz="2000" b="1" dirty="0"/>
-              <a:t>Age Group</a:t>
+              <a:t>Nationality</a:t>
             </a:r>
           </a:p>
         </p:txBody>
       </p:sp>
       <p:sp>
         <p:nvSpPr>
-          <p:cNvPr id="33" name="TextBox 32">
-            <a:extLst>
-              <a:ext uri="{FF2B5EF4-FFF2-40B4-BE49-F238E27FC236}">
-                <a16:creationId xmlns:a16="http://schemas.microsoft.com/office/drawing/2014/main" id="{6B1B07F7-CC58-43FC-AC13-A2B762AAB5D3}"/>
+          <p:cNvPr id="60" name="TextBox 59">
+            <a:extLst>
+              <a:ext uri="{FF2B5EF4-FFF2-40B4-BE49-F238E27FC236}">
+                <a16:creationId xmlns:a16="http://schemas.microsoft.com/office/drawing/2014/main" id="{7B25E7B5-46CB-484D-B4A2-C6141CE27A41}"/>
               </a:ext>
             </a:extLst>
           </p:cNvPr>
@@ -5729,79 +6245,7 @@
         </p:nvSpPr>
         <p:spPr>
           <a:xfrm>
-            <a:off x="1177628" y="5302824"/>
-            <a:ext cx="1004341" cy="369332"/>
-          </a:xfrm>
-          <a:prstGeom prst="rect">
-            <a:avLst/>
-          </a:prstGeom>
-          <a:noFill/>
-        </p:spPr>
-        <p:txBody>
-          <a:bodyPr wrap="square" rtlCol="0">
-            <a:spAutoFit/>
-          </a:bodyPr>
-          <a:lstStyle/>
-          <a:p>
-            <a:pPr algn="ctr"/>
-            <a:r>
-              <a:rPr lang="en-GB" dirty="0"/>
-              <a:t>Child</a:t>
-            </a:r>
-          </a:p>
-        </p:txBody>
-      </p:sp>
-      <p:sp>
-        <p:nvSpPr>
-          <p:cNvPr id="34" name="TextBox 33">
-            <a:extLst>
-              <a:ext uri="{FF2B5EF4-FFF2-40B4-BE49-F238E27FC236}">
-                <a16:creationId xmlns:a16="http://schemas.microsoft.com/office/drawing/2014/main" id="{C1C55292-D52D-4B39-B60C-F40A29B31F25}"/>
-              </a:ext>
-            </a:extLst>
-          </p:cNvPr>
-          <p:cNvSpPr txBox="1"/>
-          <p:nvPr/>
-        </p:nvSpPr>
-        <p:spPr>
-          <a:xfrm>
-            <a:off x="2367029" y="5328124"/>
-            <a:ext cx="1054844" cy="369332"/>
-          </a:xfrm>
-          <a:prstGeom prst="rect">
-            <a:avLst/>
-          </a:prstGeom>
-          <a:noFill/>
-        </p:spPr>
-        <p:txBody>
-          <a:bodyPr wrap="square" rtlCol="0">
-            <a:spAutoFit/>
-          </a:bodyPr>
-          <a:lstStyle/>
-          <a:p>
-            <a:pPr algn="ctr"/>
-            <a:r>
-              <a:rPr lang="en-GB" dirty="0"/>
-              <a:t>Teenager</a:t>
-            </a:r>
-          </a:p>
-        </p:txBody>
-      </p:sp>
-      <p:sp>
-        <p:nvSpPr>
-          <p:cNvPr id="35" name="TextBox 34">
-            <a:extLst>
-              <a:ext uri="{FF2B5EF4-FFF2-40B4-BE49-F238E27FC236}">
-                <a16:creationId xmlns:a16="http://schemas.microsoft.com/office/drawing/2014/main" id="{9BDE626D-F348-4959-B48D-E2C83847A1D5}"/>
-              </a:ext>
-            </a:extLst>
-          </p:cNvPr>
-          <p:cNvSpPr txBox="1"/>
-          <p:nvPr/>
-        </p:nvSpPr>
-        <p:spPr>
-          <a:xfrm>
-            <a:off x="5183934" y="5075233"/>
+            <a:off x="5256855" y="7200134"/>
             <a:ext cx="1182522" cy="646331"/>
           </a:xfrm>
           <a:prstGeom prst="rect">
@@ -5825,10 +6269,10 @@
       </p:sp>
       <p:sp>
         <p:nvSpPr>
-          <p:cNvPr id="36" name="Oval 35">
-            <a:extLst>
-              <a:ext uri="{FF2B5EF4-FFF2-40B4-BE49-F238E27FC236}">
-                <a16:creationId xmlns:a16="http://schemas.microsoft.com/office/drawing/2014/main" id="{61A487DC-A893-40C3-8268-2D0F1816ED71}"/>
+          <p:cNvPr id="62" name="Rectangle 61">
+            <a:extLst>
+              <a:ext uri="{FF2B5EF4-FFF2-40B4-BE49-F238E27FC236}">
+                <a16:creationId xmlns:a16="http://schemas.microsoft.com/office/drawing/2014/main" id="{8B500B06-F0B3-4000-9844-3F9B55D1BC18}"/>
               </a:ext>
             </a:extLst>
           </p:cNvPr>
@@ -5837,344 +6281,7 @@
         </p:nvSpPr>
         <p:spPr>
           <a:xfrm>
-            <a:off x="3944635" y="5681723"/>
-            <a:ext cx="252000" cy="253079"/>
-          </a:xfrm>
-          <a:prstGeom prst="ellipse">
-            <a:avLst/>
-          </a:prstGeom>
-          <a:solidFill>
-            <a:schemeClr val="bg1"/>
-          </a:solidFill>
-        </p:spPr>
-        <p:style>
-          <a:lnRef idx="2">
-            <a:schemeClr val="dk1">
-              <a:shade val="50000"/>
-            </a:schemeClr>
-          </a:lnRef>
-          <a:fillRef idx="1">
-            <a:schemeClr val="dk1"/>
-          </a:fillRef>
-          <a:effectRef idx="0">
-            <a:schemeClr val="dk1"/>
-          </a:effectRef>
-          <a:fontRef idx="minor">
-            <a:schemeClr val="lt1"/>
-          </a:fontRef>
-        </p:style>
-        <p:txBody>
-          <a:bodyPr rtlCol="0" anchor="ctr"/>
-          <a:lstStyle/>
-          <a:p>
-            <a:pPr algn="ctr"/>
-            <a:endParaRPr lang="en-GB"/>
-          </a:p>
-        </p:txBody>
-      </p:sp>
-      <p:sp>
-        <p:nvSpPr>
-          <p:cNvPr id="37" name="TextBox 36">
-            <a:extLst>
-              <a:ext uri="{FF2B5EF4-FFF2-40B4-BE49-F238E27FC236}">
-                <a16:creationId xmlns:a16="http://schemas.microsoft.com/office/drawing/2014/main" id="{BFE317C3-5F1C-46E3-BB75-804ED2A9E706}"/>
-              </a:ext>
-            </a:extLst>
-          </p:cNvPr>
-          <p:cNvSpPr txBox="1"/>
-          <p:nvPr/>
-        </p:nvSpPr>
-        <p:spPr>
-          <a:xfrm>
-            <a:off x="3548921" y="5333998"/>
-            <a:ext cx="1004341" cy="369332"/>
-          </a:xfrm>
-          <a:prstGeom prst="rect">
-            <a:avLst/>
-          </a:prstGeom>
-          <a:noFill/>
-        </p:spPr>
-        <p:txBody>
-          <a:bodyPr wrap="square" rtlCol="0">
-            <a:spAutoFit/>
-          </a:bodyPr>
-          <a:lstStyle/>
-          <a:p>
-            <a:pPr algn="ctr"/>
-            <a:r>
-              <a:rPr lang="en-GB" dirty="0"/>
-              <a:t>Adult</a:t>
-            </a:r>
-          </a:p>
-        </p:txBody>
-      </p:sp>
-      <p:sp>
-        <p:nvSpPr>
-          <p:cNvPr id="38" name="Oval 37">
-            <a:extLst>
-              <a:ext uri="{FF2B5EF4-FFF2-40B4-BE49-F238E27FC236}">
-                <a16:creationId xmlns:a16="http://schemas.microsoft.com/office/drawing/2014/main" id="{24917541-EE29-4829-92EE-2965344DACCC}"/>
-              </a:ext>
-            </a:extLst>
-          </p:cNvPr>
-          <p:cNvSpPr/>
-          <p:nvPr/>
-        </p:nvSpPr>
-        <p:spPr>
-          <a:xfrm>
-            <a:off x="4723178" y="5692966"/>
-            <a:ext cx="252000" cy="253079"/>
-          </a:xfrm>
-          <a:prstGeom prst="ellipse">
-            <a:avLst/>
-          </a:prstGeom>
-          <a:solidFill>
-            <a:schemeClr val="bg1"/>
-          </a:solidFill>
-        </p:spPr>
-        <p:style>
-          <a:lnRef idx="2">
-            <a:schemeClr val="dk1">
-              <a:shade val="50000"/>
-            </a:schemeClr>
-          </a:lnRef>
-          <a:fillRef idx="1">
-            <a:schemeClr val="dk1"/>
-          </a:fillRef>
-          <a:effectRef idx="0">
-            <a:schemeClr val="dk1"/>
-          </a:effectRef>
-          <a:fontRef idx="minor">
-            <a:schemeClr val="lt1"/>
-          </a:fontRef>
-        </p:style>
-        <p:txBody>
-          <a:bodyPr rtlCol="0" anchor="ctr"/>
-          <a:lstStyle/>
-          <a:p>
-            <a:pPr algn="ctr"/>
-            <a:endParaRPr lang="en-GB"/>
-          </a:p>
-        </p:txBody>
-      </p:sp>
-      <p:sp>
-        <p:nvSpPr>
-          <p:cNvPr id="39" name="TextBox 38">
-            <a:extLst>
-              <a:ext uri="{FF2B5EF4-FFF2-40B4-BE49-F238E27FC236}">
-                <a16:creationId xmlns:a16="http://schemas.microsoft.com/office/drawing/2014/main" id="{434702F6-99DB-4DE1-A8F9-5F0155DB6386}"/>
-              </a:ext>
-            </a:extLst>
-          </p:cNvPr>
-          <p:cNvSpPr txBox="1"/>
-          <p:nvPr/>
-        </p:nvSpPr>
-        <p:spPr>
-          <a:xfrm>
-            <a:off x="4327464" y="5345241"/>
-            <a:ext cx="1004341" cy="369332"/>
-          </a:xfrm>
-          <a:prstGeom prst="rect">
-            <a:avLst/>
-          </a:prstGeom>
-          <a:noFill/>
-        </p:spPr>
-        <p:txBody>
-          <a:bodyPr wrap="square" rtlCol="0">
-            <a:spAutoFit/>
-          </a:bodyPr>
-          <a:lstStyle/>
-          <a:p>
-            <a:pPr algn="ctr"/>
-            <a:r>
-              <a:rPr lang="en-GB" dirty="0"/>
-              <a:t>Old</a:t>
-            </a:r>
-          </a:p>
-        </p:txBody>
-      </p:sp>
-      <p:sp>
-        <p:nvSpPr>
-          <p:cNvPr id="53" name="Rectangle: Rounded Corners 52">
-            <a:extLst>
-              <a:ext uri="{FF2B5EF4-FFF2-40B4-BE49-F238E27FC236}">
-                <a16:creationId xmlns:a16="http://schemas.microsoft.com/office/drawing/2014/main" id="{0ADEB49C-016F-4676-88D1-8633C9240A6A}"/>
-              </a:ext>
-            </a:extLst>
-          </p:cNvPr>
-          <p:cNvSpPr/>
-          <p:nvPr/>
-        </p:nvSpPr>
-        <p:spPr>
-          <a:xfrm>
-            <a:off x="744032" y="6581876"/>
-            <a:ext cx="5996065" cy="1266669"/>
-          </a:xfrm>
-          <a:prstGeom prst="roundRect">
-            <a:avLst/>
-          </a:prstGeom>
-        </p:spPr>
-        <p:style>
-          <a:lnRef idx="2">
-            <a:schemeClr val="accent2">
-              <a:shade val="50000"/>
-            </a:schemeClr>
-          </a:lnRef>
-          <a:fillRef idx="1">
-            <a:schemeClr val="accent2"/>
-          </a:fillRef>
-          <a:effectRef idx="0">
-            <a:schemeClr val="accent2"/>
-          </a:effectRef>
-          <a:fontRef idx="minor">
-            <a:schemeClr val="lt1"/>
-          </a:fontRef>
-        </p:style>
-        <p:txBody>
-          <a:bodyPr rtlCol="0" anchor="ctr"/>
-          <a:lstStyle/>
-          <a:p>
-            <a:pPr algn="ctr"/>
-            <a:endParaRPr lang="en-GB"/>
-          </a:p>
-        </p:txBody>
-      </p:sp>
-      <p:sp>
-        <p:nvSpPr>
-          <p:cNvPr id="56" name="Oval 55">
-            <a:extLst>
-              <a:ext uri="{FF2B5EF4-FFF2-40B4-BE49-F238E27FC236}">
-                <a16:creationId xmlns:a16="http://schemas.microsoft.com/office/drawing/2014/main" id="{17DC1A83-84C4-44FA-9470-37751A1F9D60}"/>
-              </a:ext>
-            </a:extLst>
-          </p:cNvPr>
-          <p:cNvSpPr/>
-          <p:nvPr/>
-        </p:nvSpPr>
-        <p:spPr>
-          <a:xfrm>
-            <a:off x="5671735" y="7373112"/>
-            <a:ext cx="252000" cy="253079"/>
-          </a:xfrm>
-          <a:prstGeom prst="ellipse">
-            <a:avLst/>
-          </a:prstGeom>
-          <a:solidFill>
-            <a:schemeClr val="bg1"/>
-          </a:solidFill>
-        </p:spPr>
-        <p:style>
-          <a:lnRef idx="2">
-            <a:schemeClr val="dk1">
-              <a:shade val="50000"/>
-            </a:schemeClr>
-          </a:lnRef>
-          <a:fillRef idx="1">
-            <a:schemeClr val="dk1"/>
-          </a:fillRef>
-          <a:effectRef idx="0">
-            <a:schemeClr val="dk1"/>
-          </a:effectRef>
-          <a:fontRef idx="minor">
-            <a:schemeClr val="lt1"/>
-          </a:fontRef>
-        </p:style>
-        <p:txBody>
-          <a:bodyPr rtlCol="0" anchor="ctr"/>
-          <a:lstStyle/>
-          <a:p>
-            <a:pPr algn="ctr"/>
-            <a:endParaRPr lang="en-GB"/>
-          </a:p>
-        </p:txBody>
-      </p:sp>
-      <p:sp>
-        <p:nvSpPr>
-          <p:cNvPr id="57" name="TextBox 56">
-            <a:extLst>
-              <a:ext uri="{FF2B5EF4-FFF2-40B4-BE49-F238E27FC236}">
-                <a16:creationId xmlns:a16="http://schemas.microsoft.com/office/drawing/2014/main" id="{C03038FD-42F4-4F4B-A991-18E1D3490EDB}"/>
-              </a:ext>
-            </a:extLst>
-          </p:cNvPr>
-          <p:cNvSpPr txBox="1"/>
-          <p:nvPr/>
-        </p:nvSpPr>
-        <p:spPr>
-          <a:xfrm>
-            <a:off x="2876382" y="6576134"/>
-            <a:ext cx="1731364" cy="400110"/>
-          </a:xfrm>
-          <a:prstGeom prst="rect">
-            <a:avLst/>
-          </a:prstGeom>
-          <a:noFill/>
-        </p:spPr>
-        <p:txBody>
-          <a:bodyPr wrap="square" rtlCol="0">
-            <a:spAutoFit/>
-          </a:bodyPr>
-          <a:lstStyle/>
-          <a:p>
-            <a:pPr algn="ctr"/>
-            <a:r>
-              <a:rPr lang="en-GB" sz="2000" b="1" dirty="0"/>
-              <a:t>Nationality</a:t>
-            </a:r>
-          </a:p>
-        </p:txBody>
-      </p:sp>
-      <p:sp>
-        <p:nvSpPr>
-          <p:cNvPr id="60" name="TextBox 59">
-            <a:extLst>
-              <a:ext uri="{FF2B5EF4-FFF2-40B4-BE49-F238E27FC236}">
-                <a16:creationId xmlns:a16="http://schemas.microsoft.com/office/drawing/2014/main" id="{7B25E7B5-46CB-484D-B4A2-C6141CE27A41}"/>
-              </a:ext>
-            </a:extLst>
-          </p:cNvPr>
-          <p:cNvSpPr txBox="1"/>
-          <p:nvPr/>
-        </p:nvSpPr>
-        <p:spPr>
-          <a:xfrm>
-            <a:off x="5256855" y="6776189"/>
-            <a:ext cx="1182522" cy="646331"/>
-          </a:xfrm>
-          <a:prstGeom prst="rect">
-            <a:avLst/>
-          </a:prstGeom>
-          <a:noFill/>
-        </p:spPr>
-        <p:txBody>
-          <a:bodyPr wrap="square" rtlCol="0">
-            <a:spAutoFit/>
-          </a:bodyPr>
-          <a:lstStyle/>
-          <a:p>
-            <a:pPr algn="ctr"/>
-            <a:r>
-              <a:rPr lang="en-GB" dirty="0"/>
-              <a:t>Preferer not to say</a:t>
-            </a:r>
-          </a:p>
-        </p:txBody>
-      </p:sp>
-      <p:sp>
-        <p:nvSpPr>
-          <p:cNvPr id="62" name="Rectangle 61">
-            <a:extLst>
-              <a:ext uri="{FF2B5EF4-FFF2-40B4-BE49-F238E27FC236}">
-                <a16:creationId xmlns:a16="http://schemas.microsoft.com/office/drawing/2014/main" id="{8B500B06-F0B3-4000-9844-3F9B55D1BC18}"/>
-              </a:ext>
-            </a:extLst>
-          </p:cNvPr>
-          <p:cNvSpPr/>
-          <p:nvPr/>
-        </p:nvSpPr>
-        <p:spPr>
-          <a:xfrm>
-            <a:off x="1177628" y="7037882"/>
+            <a:off x="1177628" y="7461827"/>
             <a:ext cx="3978465" cy="588309"/>
           </a:xfrm>
           <a:prstGeom prst="rect">
@@ -6228,7 +6335,7 @@
         </p:nvSpPr>
         <p:spPr>
           <a:xfrm>
-            <a:off x="1264409" y="7153547"/>
+            <a:off x="1264409" y="7577492"/>
             <a:ext cx="3407601" cy="369332"/>
           </a:xfrm>
           <a:prstGeom prst="rect">
@@ -6269,8 +6376,8 @@
         </p:nvSpPr>
         <p:spPr>
           <a:xfrm>
-            <a:off x="744032" y="8178329"/>
-            <a:ext cx="5996065" cy="1266669"/>
+            <a:off x="708324" y="8603650"/>
+            <a:ext cx="5996065" cy="1168806"/>
           </a:xfrm>
           <a:prstGeom prst="roundRect">
             <a:avLst/>
@@ -6315,7 +6422,7 @@
         </p:nvSpPr>
         <p:spPr>
           <a:xfrm>
-            <a:off x="5671735" y="8969565"/>
+            <a:off x="5636027" y="9350101"/>
             <a:ext cx="252000" cy="253079"/>
           </a:xfrm>
           <a:prstGeom prst="ellipse">
@@ -6364,7 +6471,7 @@
         </p:nvSpPr>
         <p:spPr>
           <a:xfrm>
-            <a:off x="2876382" y="8172587"/>
+            <a:off x="2840674" y="8613318"/>
             <a:ext cx="1731364" cy="400110"/>
           </a:xfrm>
           <a:prstGeom prst="rect">
@@ -6400,7 +6507,7 @@
         </p:nvSpPr>
         <p:spPr>
           <a:xfrm>
-            <a:off x="5256855" y="8372642"/>
+            <a:off x="5221147" y="8753178"/>
             <a:ext cx="1182522" cy="646331"/>
           </a:xfrm>
           <a:prstGeom prst="rect">
@@ -6436,7 +6543,7 @@
         </p:nvSpPr>
         <p:spPr>
           <a:xfrm>
-            <a:off x="1177628" y="8634335"/>
+            <a:off x="1141920" y="9014871"/>
             <a:ext cx="3978465" cy="588309"/>
           </a:xfrm>
           <a:prstGeom prst="rect">
@@ -6490,7 +6597,7 @@
         </p:nvSpPr>
         <p:spPr>
           <a:xfrm>
-            <a:off x="1264409" y="8750000"/>
+            <a:off x="1228701" y="9130536"/>
             <a:ext cx="3407601" cy="369332"/>
           </a:xfrm>
           <a:prstGeom prst="rect">
@@ -6531,7 +6638,7 @@
         </p:nvSpPr>
         <p:spPr>
           <a:xfrm>
-            <a:off x="5680251" y="2233870"/>
+            <a:off x="5717088" y="3252248"/>
             <a:ext cx="126000" cy="126000"/>
           </a:xfrm>
           <a:prstGeom prst="ellipse">
@@ -6577,7 +6684,7 @@
         </p:nvSpPr>
         <p:spPr>
           <a:xfrm>
-            <a:off x="4286777" y="2193822"/>
+            <a:off x="4098902" y="3185865"/>
             <a:ext cx="252000" cy="253079"/>
           </a:xfrm>
           <a:prstGeom prst="ellipse">
@@ -6626,7 +6733,7 @@
         </p:nvSpPr>
         <p:spPr>
           <a:xfrm>
-            <a:off x="3948081" y="1824490"/>
+            <a:off x="3760206" y="2816533"/>
             <a:ext cx="1004341" cy="369332"/>
           </a:xfrm>
           <a:prstGeom prst="rect">
@@ -6662,7 +6769,7 @@
         </p:nvSpPr>
         <p:spPr>
           <a:xfrm>
-            <a:off x="5679658" y="3919380"/>
+            <a:off x="5598814" y="4726596"/>
             <a:ext cx="252000" cy="253079"/>
           </a:xfrm>
           <a:prstGeom prst="ellipse">
@@ -6699,10 +6806,10 @@
       </p:sp>
       <p:sp>
         <p:nvSpPr>
-          <p:cNvPr id="77" name="Oval 76">
-            <a:extLst>
-              <a:ext uri="{FF2B5EF4-FFF2-40B4-BE49-F238E27FC236}">
-                <a16:creationId xmlns:a16="http://schemas.microsoft.com/office/drawing/2014/main" id="{B9A7113B-B1FE-41D6-BB65-D2FB33838EC4}"/>
+          <p:cNvPr id="78" name="Oval 77">
+            <a:extLst>
+              <a:ext uri="{FF2B5EF4-FFF2-40B4-BE49-F238E27FC236}">
+                <a16:creationId xmlns:a16="http://schemas.microsoft.com/office/drawing/2014/main" id="{5C828593-6F85-4DBD-9AF9-EB18C82F20BD}"/>
               </a:ext>
             </a:extLst>
           </p:cNvPr>
@@ -6711,12 +6818,15 @@
         </p:nvSpPr>
         <p:spPr>
           <a:xfrm>
-            <a:off x="5742658" y="3982919"/>
-            <a:ext cx="126000" cy="126000"/>
+            <a:off x="5617251" y="6198535"/>
+            <a:ext cx="252000" cy="253079"/>
           </a:xfrm>
           <a:prstGeom prst="ellipse">
             <a:avLst/>
           </a:prstGeom>
+          <a:solidFill>
+            <a:schemeClr val="bg1"/>
+          </a:solidFill>
         </p:spPr>
         <p:style>
           <a:lnRef idx="2">
@@ -6745,10 +6855,10 @@
       </p:sp>
       <p:sp>
         <p:nvSpPr>
-          <p:cNvPr id="78" name="Oval 77">
-            <a:extLst>
-              <a:ext uri="{FF2B5EF4-FFF2-40B4-BE49-F238E27FC236}">
-                <a16:creationId xmlns:a16="http://schemas.microsoft.com/office/drawing/2014/main" id="{5C828593-6F85-4DBD-9AF9-EB18C82F20BD}"/>
+          <p:cNvPr id="79" name="Oval 78">
+            <a:extLst>
+              <a:ext uri="{FF2B5EF4-FFF2-40B4-BE49-F238E27FC236}">
+                <a16:creationId xmlns:a16="http://schemas.microsoft.com/office/drawing/2014/main" id="{E2AB95E9-A619-4011-AEEE-1CCC14DA4624}"/>
               </a:ext>
             </a:extLst>
           </p:cNvPr>
@@ -6757,15 +6867,12 @@
         </p:nvSpPr>
         <p:spPr>
           <a:xfrm>
-            <a:off x="5598814" y="5671000"/>
-            <a:ext cx="252000" cy="253079"/>
+            <a:off x="5680251" y="6262074"/>
+            <a:ext cx="126000" cy="126000"/>
           </a:xfrm>
           <a:prstGeom prst="ellipse">
             <a:avLst/>
           </a:prstGeom>
-          <a:solidFill>
-            <a:schemeClr val="bg1"/>
-          </a:solidFill>
         </p:spPr>
         <p:style>
           <a:lnRef idx="2">
@@ -6794,10 +6901,10 @@
       </p:sp>
       <p:sp>
         <p:nvSpPr>
-          <p:cNvPr id="79" name="Oval 78">
-            <a:extLst>
-              <a:ext uri="{FF2B5EF4-FFF2-40B4-BE49-F238E27FC236}">
-                <a16:creationId xmlns:a16="http://schemas.microsoft.com/office/drawing/2014/main" id="{E2AB95E9-A619-4011-AEEE-1CCC14DA4624}"/>
+          <p:cNvPr id="80" name="Oval 79">
+            <a:extLst>
+              <a:ext uri="{FF2B5EF4-FFF2-40B4-BE49-F238E27FC236}">
+                <a16:creationId xmlns:a16="http://schemas.microsoft.com/office/drawing/2014/main" id="{4D49AB93-CE17-49D6-B580-DEA1C8470675}"/>
               </a:ext>
             </a:extLst>
           </p:cNvPr>
@@ -6806,12 +6913,15 @@
         </p:nvSpPr>
         <p:spPr>
           <a:xfrm>
-            <a:off x="5661814" y="5734539"/>
-            <a:ext cx="126000" cy="126000"/>
+            <a:off x="5668724" y="7799433"/>
+            <a:ext cx="252000" cy="253079"/>
           </a:xfrm>
           <a:prstGeom prst="ellipse">
             <a:avLst/>
           </a:prstGeom>
+          <a:solidFill>
+            <a:schemeClr val="bg1"/>
+          </a:solidFill>
         </p:spPr>
         <p:style>
           <a:lnRef idx="2">
@@ -6840,10 +6950,10 @@
       </p:sp>
       <p:sp>
         <p:nvSpPr>
-          <p:cNvPr id="80" name="Oval 79">
-            <a:extLst>
-              <a:ext uri="{FF2B5EF4-FFF2-40B4-BE49-F238E27FC236}">
-                <a16:creationId xmlns:a16="http://schemas.microsoft.com/office/drawing/2014/main" id="{4D49AB93-CE17-49D6-B580-DEA1C8470675}"/>
+          <p:cNvPr id="81" name="Oval 80">
+            <a:extLst>
+              <a:ext uri="{FF2B5EF4-FFF2-40B4-BE49-F238E27FC236}">
+                <a16:creationId xmlns:a16="http://schemas.microsoft.com/office/drawing/2014/main" id="{B5440A46-B9B2-4C67-B9C3-B57D8C02714F}"/>
               </a:ext>
             </a:extLst>
           </p:cNvPr>
@@ -6852,15 +6962,12 @@
         </p:nvSpPr>
         <p:spPr>
           <a:xfrm>
-            <a:off x="5668724" y="7375488"/>
-            <a:ext cx="252000" cy="253079"/>
+            <a:off x="5731724" y="7862972"/>
+            <a:ext cx="126000" cy="126000"/>
           </a:xfrm>
           <a:prstGeom prst="ellipse">
             <a:avLst/>
           </a:prstGeom>
-          <a:solidFill>
-            <a:schemeClr val="bg1"/>
-          </a:solidFill>
         </p:spPr>
         <p:style>
           <a:lnRef idx="2">
@@ -6889,10 +6996,10 @@
       </p:sp>
       <p:sp>
         <p:nvSpPr>
-          <p:cNvPr id="81" name="Oval 80">
-            <a:extLst>
-              <a:ext uri="{FF2B5EF4-FFF2-40B4-BE49-F238E27FC236}">
-                <a16:creationId xmlns:a16="http://schemas.microsoft.com/office/drawing/2014/main" id="{B5440A46-B9B2-4C67-B9C3-B57D8C02714F}"/>
+          <p:cNvPr id="82" name="Oval 81">
+            <a:extLst>
+              <a:ext uri="{FF2B5EF4-FFF2-40B4-BE49-F238E27FC236}">
+                <a16:creationId xmlns:a16="http://schemas.microsoft.com/office/drawing/2014/main" id="{C62DEA33-A43F-45D5-9FE7-52679662F93A}"/>
               </a:ext>
             </a:extLst>
           </p:cNvPr>
@@ -6901,12 +7008,15 @@
         </p:nvSpPr>
         <p:spPr>
           <a:xfrm>
-            <a:off x="5731724" y="7439027"/>
-            <a:ext cx="126000" cy="126000"/>
+            <a:off x="5636064" y="9352477"/>
+            <a:ext cx="252000" cy="253079"/>
           </a:xfrm>
           <a:prstGeom prst="ellipse">
             <a:avLst/>
           </a:prstGeom>
+          <a:solidFill>
+            <a:schemeClr val="bg1"/>
+          </a:solidFill>
         </p:spPr>
         <p:style>
           <a:lnRef idx="2">
@@ -6935,10 +7045,10 @@
       </p:sp>
       <p:sp>
         <p:nvSpPr>
-          <p:cNvPr id="82" name="Oval 81">
-            <a:extLst>
-              <a:ext uri="{FF2B5EF4-FFF2-40B4-BE49-F238E27FC236}">
-                <a16:creationId xmlns:a16="http://schemas.microsoft.com/office/drawing/2014/main" id="{C62DEA33-A43F-45D5-9FE7-52679662F93A}"/>
+          <p:cNvPr id="83" name="Oval 82">
+            <a:extLst>
+              <a:ext uri="{FF2B5EF4-FFF2-40B4-BE49-F238E27FC236}">
+                <a16:creationId xmlns:a16="http://schemas.microsoft.com/office/drawing/2014/main" id="{EA85BA03-DE9B-441C-A12E-41670981AE84}"/>
               </a:ext>
             </a:extLst>
           </p:cNvPr>
@@ -6947,15 +7057,12 @@
         </p:nvSpPr>
         <p:spPr>
           <a:xfrm>
-            <a:off x="5671772" y="8971941"/>
-            <a:ext cx="252000" cy="253079"/>
+            <a:off x="5699064" y="9416016"/>
+            <a:ext cx="126000" cy="126000"/>
           </a:xfrm>
           <a:prstGeom prst="ellipse">
             <a:avLst/>
           </a:prstGeom>
-          <a:solidFill>
-            <a:schemeClr val="bg1"/>
-          </a:solidFill>
         </p:spPr>
         <p:style>
           <a:lnRef idx="2">
@@ -6984,10 +7091,10 @@
       </p:sp>
       <p:sp>
         <p:nvSpPr>
-          <p:cNvPr id="83" name="Oval 82">
-            <a:extLst>
-              <a:ext uri="{FF2B5EF4-FFF2-40B4-BE49-F238E27FC236}">
-                <a16:creationId xmlns:a16="http://schemas.microsoft.com/office/drawing/2014/main" id="{EA85BA03-DE9B-441C-A12E-41670981AE84}"/>
+          <p:cNvPr id="58" name="Rectangle 57">
+            <a:extLst>
+              <a:ext uri="{FF2B5EF4-FFF2-40B4-BE49-F238E27FC236}">
+                <a16:creationId xmlns:a16="http://schemas.microsoft.com/office/drawing/2014/main" id="{EB395042-325C-441A-A27B-48091D2A56C1}"/>
               </a:ext>
             </a:extLst>
           </p:cNvPr>
@@ -6996,7 +7103,357 @@
         </p:nvSpPr>
         <p:spPr>
           <a:xfrm>
-            <a:off x="5734772" y="9035480"/>
+            <a:off x="-1" y="0"/>
+            <a:ext cx="7199313" cy="10799763"/>
+          </a:xfrm>
+          <a:prstGeom prst="rect">
+            <a:avLst/>
+          </a:prstGeom>
+          <a:noFill/>
+          <a:ln w="38100">
+            <a:solidFill>
+              <a:schemeClr val="tx1"/>
+            </a:solidFill>
+          </a:ln>
+        </p:spPr>
+        <p:style>
+          <a:lnRef idx="2">
+            <a:schemeClr val="accent1">
+              <a:shade val="50000"/>
+            </a:schemeClr>
+          </a:lnRef>
+          <a:fillRef idx="1">
+            <a:schemeClr val="accent1"/>
+          </a:fillRef>
+          <a:effectRef idx="0">
+            <a:schemeClr val="accent1"/>
+          </a:effectRef>
+          <a:fontRef idx="minor">
+            <a:schemeClr val="lt1"/>
+          </a:fontRef>
+        </p:style>
+        <p:txBody>
+          <a:bodyPr rtlCol="0" anchor="ctr"/>
+          <a:lstStyle/>
+          <a:p>
+            <a:pPr algn="ctr"/>
+            <a:endParaRPr lang="en-GB"/>
+          </a:p>
+        </p:txBody>
+      </p:sp>
+      <p:sp>
+        <p:nvSpPr>
+          <p:cNvPr id="73" name="Rectangle: Rounded Corners 72">
+            <a:extLst>
+              <a:ext uri="{FF2B5EF4-FFF2-40B4-BE49-F238E27FC236}">
+                <a16:creationId xmlns:a16="http://schemas.microsoft.com/office/drawing/2014/main" id="{561EDC5D-235D-4FD3-A668-B320B0894649}"/>
+              </a:ext>
+            </a:extLst>
+          </p:cNvPr>
+          <p:cNvSpPr/>
+          <p:nvPr/>
+        </p:nvSpPr>
+        <p:spPr>
+          <a:xfrm>
+            <a:off x="725861" y="1204642"/>
+            <a:ext cx="6031138" cy="770309"/>
+          </a:xfrm>
+          <a:prstGeom prst="roundRect">
+            <a:avLst/>
+          </a:prstGeom>
+        </p:spPr>
+        <p:style>
+          <a:lnRef idx="2">
+            <a:schemeClr val="accent2">
+              <a:shade val="50000"/>
+            </a:schemeClr>
+          </a:lnRef>
+          <a:fillRef idx="1">
+            <a:schemeClr val="accent2"/>
+          </a:fillRef>
+          <a:effectRef idx="0">
+            <a:schemeClr val="accent2"/>
+          </a:effectRef>
+          <a:fontRef idx="minor">
+            <a:schemeClr val="lt1"/>
+          </a:fontRef>
+        </p:style>
+        <p:txBody>
+          <a:bodyPr rtlCol="0" anchor="ctr"/>
+          <a:lstStyle/>
+          <a:p>
+            <a:pPr algn="ctr"/>
+            <a:endParaRPr lang="en-GB"/>
+          </a:p>
+        </p:txBody>
+      </p:sp>
+      <p:sp>
+        <p:nvSpPr>
+          <p:cNvPr id="84" name="TextBox 83">
+            <a:extLst>
+              <a:ext uri="{FF2B5EF4-FFF2-40B4-BE49-F238E27FC236}">
+                <a16:creationId xmlns:a16="http://schemas.microsoft.com/office/drawing/2014/main" id="{EA9E0B90-44CE-469A-BC30-4EA29990BFDE}"/>
+              </a:ext>
+            </a:extLst>
+          </p:cNvPr>
+          <p:cNvSpPr txBox="1"/>
+          <p:nvPr/>
+        </p:nvSpPr>
+        <p:spPr>
+          <a:xfrm>
+            <a:off x="776520" y="1259881"/>
+            <a:ext cx="2132350" cy="707886"/>
+          </a:xfrm>
+          <a:prstGeom prst="rect">
+            <a:avLst/>
+          </a:prstGeom>
+          <a:noFill/>
+        </p:spPr>
+        <p:txBody>
+          <a:bodyPr wrap="square" rtlCol="0">
+            <a:spAutoFit/>
+          </a:bodyPr>
+          <a:lstStyle/>
+          <a:p>
+            <a:pPr algn="ctr"/>
+            <a:r>
+              <a:rPr lang="en-GB" sz="2000" b="1" dirty="0"/>
+              <a:t>Allow data used for studies</a:t>
+            </a:r>
+          </a:p>
+        </p:txBody>
+      </p:sp>
+      <p:sp>
+        <p:nvSpPr>
+          <p:cNvPr id="85" name="Oval 84">
+            <a:extLst>
+              <a:ext uri="{FF2B5EF4-FFF2-40B4-BE49-F238E27FC236}">
+                <a16:creationId xmlns:a16="http://schemas.microsoft.com/office/drawing/2014/main" id="{3B0BD2FA-9906-412A-9810-8878450AB191}"/>
+              </a:ext>
+            </a:extLst>
+          </p:cNvPr>
+          <p:cNvSpPr/>
+          <p:nvPr/>
+        </p:nvSpPr>
+        <p:spPr>
+          <a:xfrm>
+            <a:off x="4444952" y="1615285"/>
+            <a:ext cx="252000" cy="253079"/>
+          </a:xfrm>
+          <a:prstGeom prst="ellipse">
+            <a:avLst/>
+          </a:prstGeom>
+          <a:solidFill>
+            <a:schemeClr val="bg1"/>
+          </a:solidFill>
+        </p:spPr>
+        <p:style>
+          <a:lnRef idx="2">
+            <a:schemeClr val="dk1">
+              <a:shade val="50000"/>
+            </a:schemeClr>
+          </a:lnRef>
+          <a:fillRef idx="1">
+            <a:schemeClr val="dk1"/>
+          </a:fillRef>
+          <a:effectRef idx="0">
+            <a:schemeClr val="dk1"/>
+          </a:effectRef>
+          <a:fontRef idx="minor">
+            <a:schemeClr val="lt1"/>
+          </a:fontRef>
+        </p:style>
+        <p:txBody>
+          <a:bodyPr rtlCol="0" anchor="ctr"/>
+          <a:lstStyle/>
+          <a:p>
+            <a:pPr algn="ctr"/>
+            <a:endParaRPr lang="en-GB"/>
+          </a:p>
+        </p:txBody>
+      </p:sp>
+      <p:sp>
+        <p:nvSpPr>
+          <p:cNvPr id="86" name="TextBox 85">
+            <a:extLst>
+              <a:ext uri="{FF2B5EF4-FFF2-40B4-BE49-F238E27FC236}">
+                <a16:creationId xmlns:a16="http://schemas.microsoft.com/office/drawing/2014/main" id="{675D2883-EB84-4CAC-9A6A-DF3A9D4221CD}"/>
+              </a:ext>
+            </a:extLst>
+          </p:cNvPr>
+          <p:cNvSpPr txBox="1"/>
+          <p:nvPr/>
+        </p:nvSpPr>
+        <p:spPr>
+          <a:xfrm>
+            <a:off x="4106256" y="1245953"/>
+            <a:ext cx="1004341" cy="369332"/>
+          </a:xfrm>
+          <a:prstGeom prst="rect">
+            <a:avLst/>
+          </a:prstGeom>
+          <a:noFill/>
+        </p:spPr>
+        <p:txBody>
+          <a:bodyPr wrap="square" rtlCol="0">
+            <a:spAutoFit/>
+          </a:bodyPr>
+          <a:lstStyle/>
+          <a:p>
+            <a:pPr algn="ctr"/>
+            <a:r>
+              <a:rPr lang="en-GB" dirty="0"/>
+              <a:t>Yes</a:t>
+            </a:r>
+          </a:p>
+        </p:txBody>
+      </p:sp>
+      <p:sp>
+        <p:nvSpPr>
+          <p:cNvPr id="87" name="Oval 86">
+            <a:extLst>
+              <a:ext uri="{FF2B5EF4-FFF2-40B4-BE49-F238E27FC236}">
+                <a16:creationId xmlns:a16="http://schemas.microsoft.com/office/drawing/2014/main" id="{FFD8CECD-368E-4E84-A984-9EDF2AD87613}"/>
+              </a:ext>
+            </a:extLst>
+          </p:cNvPr>
+          <p:cNvSpPr/>
+          <p:nvPr/>
+        </p:nvSpPr>
+        <p:spPr>
+          <a:xfrm>
+            <a:off x="5699064" y="1593218"/>
+            <a:ext cx="252000" cy="253079"/>
+          </a:xfrm>
+          <a:prstGeom prst="ellipse">
+            <a:avLst/>
+          </a:prstGeom>
+          <a:solidFill>
+            <a:schemeClr val="bg1"/>
+          </a:solidFill>
+        </p:spPr>
+        <p:style>
+          <a:lnRef idx="2">
+            <a:schemeClr val="dk1">
+              <a:shade val="50000"/>
+            </a:schemeClr>
+          </a:lnRef>
+          <a:fillRef idx="1">
+            <a:schemeClr val="dk1"/>
+          </a:fillRef>
+          <a:effectRef idx="0">
+            <a:schemeClr val="dk1"/>
+          </a:effectRef>
+          <a:fontRef idx="minor">
+            <a:schemeClr val="lt1"/>
+          </a:fontRef>
+        </p:style>
+        <p:txBody>
+          <a:bodyPr rtlCol="0" anchor="ctr"/>
+          <a:lstStyle/>
+          <a:p>
+            <a:pPr algn="ctr"/>
+            <a:endParaRPr lang="en-GB"/>
+          </a:p>
+        </p:txBody>
+      </p:sp>
+      <p:sp>
+        <p:nvSpPr>
+          <p:cNvPr id="88" name="TextBox 87">
+            <a:extLst>
+              <a:ext uri="{FF2B5EF4-FFF2-40B4-BE49-F238E27FC236}">
+                <a16:creationId xmlns:a16="http://schemas.microsoft.com/office/drawing/2014/main" id="{62E800CF-CB08-437C-BC3F-0066CA4A7018}"/>
+              </a:ext>
+            </a:extLst>
+          </p:cNvPr>
+          <p:cNvSpPr txBox="1"/>
+          <p:nvPr/>
+        </p:nvSpPr>
+        <p:spPr>
+          <a:xfrm>
+            <a:off x="5360368" y="1223886"/>
+            <a:ext cx="1004341" cy="369332"/>
+          </a:xfrm>
+          <a:prstGeom prst="rect">
+            <a:avLst/>
+          </a:prstGeom>
+          <a:noFill/>
+        </p:spPr>
+        <p:txBody>
+          <a:bodyPr wrap="square" rtlCol="0">
+            <a:spAutoFit/>
+          </a:bodyPr>
+          <a:lstStyle/>
+          <a:p>
+            <a:pPr algn="ctr"/>
+            <a:r>
+              <a:rPr lang="en-GB" dirty="0"/>
+              <a:t>No</a:t>
+            </a:r>
+          </a:p>
+        </p:txBody>
+      </p:sp>
+      <p:sp>
+        <p:nvSpPr>
+          <p:cNvPr id="89" name="Oval 88">
+            <a:extLst>
+              <a:ext uri="{FF2B5EF4-FFF2-40B4-BE49-F238E27FC236}">
+                <a16:creationId xmlns:a16="http://schemas.microsoft.com/office/drawing/2014/main" id="{5684C24F-ADCB-4D0C-8F2E-541810D79317}"/>
+              </a:ext>
+            </a:extLst>
+          </p:cNvPr>
+          <p:cNvSpPr/>
+          <p:nvPr/>
+        </p:nvSpPr>
+        <p:spPr>
+          <a:xfrm>
+            <a:off x="5660095" y="4798929"/>
+            <a:ext cx="126000" cy="126000"/>
+          </a:xfrm>
+          <a:prstGeom prst="ellipse">
+            <a:avLst/>
+          </a:prstGeom>
+        </p:spPr>
+        <p:style>
+          <a:lnRef idx="2">
+            <a:schemeClr val="dk1">
+              <a:shade val="50000"/>
+            </a:schemeClr>
+          </a:lnRef>
+          <a:fillRef idx="1">
+            <a:schemeClr val="dk1"/>
+          </a:fillRef>
+          <a:effectRef idx="0">
+            <a:schemeClr val="dk1"/>
+          </a:effectRef>
+          <a:fontRef idx="minor">
+            <a:schemeClr val="lt1"/>
+          </a:fontRef>
+        </p:style>
+        <p:txBody>
+          <a:bodyPr rtlCol="0" anchor="ctr"/>
+          <a:lstStyle/>
+          <a:p>
+            <a:pPr algn="ctr"/>
+            <a:endParaRPr lang="en-GB"/>
+          </a:p>
+        </p:txBody>
+      </p:sp>
+      <p:sp>
+        <p:nvSpPr>
+          <p:cNvPr id="90" name="Oval 89">
+            <a:extLst>
+              <a:ext uri="{FF2B5EF4-FFF2-40B4-BE49-F238E27FC236}">
+                <a16:creationId xmlns:a16="http://schemas.microsoft.com/office/drawing/2014/main" id="{271CF579-EB16-4812-BE2F-C8ED012B1636}"/>
+              </a:ext>
+            </a:extLst>
+          </p:cNvPr>
+          <p:cNvSpPr/>
+          <p:nvPr/>
+        </p:nvSpPr>
+        <p:spPr>
+          <a:xfrm>
+            <a:off x="5758920" y="1665551"/>
             <a:ext cx="126000" cy="126000"/>
           </a:xfrm>
           <a:prstGeom prst="ellipse">
@@ -7496,6 +7953,58 @@
           </a:p>
         </p:txBody>
       </p:sp>
+      <p:sp>
+        <p:nvSpPr>
+          <p:cNvPr id="12" name="Rectangle 11">
+            <a:extLst>
+              <a:ext uri="{FF2B5EF4-FFF2-40B4-BE49-F238E27FC236}">
+                <a16:creationId xmlns:a16="http://schemas.microsoft.com/office/drawing/2014/main" id="{3C4D71BE-FA6E-4EAB-8772-6EE29299859E}"/>
+              </a:ext>
+            </a:extLst>
+          </p:cNvPr>
+          <p:cNvSpPr/>
+          <p:nvPr/>
+        </p:nvSpPr>
+        <p:spPr>
+          <a:xfrm>
+            <a:off x="-1" y="0"/>
+            <a:ext cx="7199313" cy="10799763"/>
+          </a:xfrm>
+          <a:prstGeom prst="rect">
+            <a:avLst/>
+          </a:prstGeom>
+          <a:noFill/>
+          <a:ln w="38100">
+            <a:solidFill>
+              <a:schemeClr val="tx1"/>
+            </a:solidFill>
+          </a:ln>
+        </p:spPr>
+        <p:style>
+          <a:lnRef idx="2">
+            <a:schemeClr val="accent1">
+              <a:shade val="50000"/>
+            </a:schemeClr>
+          </a:lnRef>
+          <a:fillRef idx="1">
+            <a:schemeClr val="accent1"/>
+          </a:fillRef>
+          <a:effectRef idx="0">
+            <a:schemeClr val="accent1"/>
+          </a:effectRef>
+          <a:fontRef idx="minor">
+            <a:schemeClr val="lt1"/>
+          </a:fontRef>
+        </p:style>
+        <p:txBody>
+          <a:bodyPr rtlCol="0" anchor="ctr"/>
+          <a:lstStyle/>
+          <a:p>
+            <a:pPr algn="ctr"/>
+            <a:endParaRPr lang="en-GB"/>
+          </a:p>
+        </p:txBody>
+      </p:sp>
     </p:spTree>
     <p:extLst>
       <p:ext uri="{BB962C8B-B14F-4D97-AF65-F5344CB8AC3E}">
@@ -8751,6 +9260,58 @@
           </a:p>
         </p:txBody>
       </p:sp>
+      <p:sp>
+        <p:nvSpPr>
+          <p:cNvPr id="31" name="Rectangle 30">
+            <a:extLst>
+              <a:ext uri="{FF2B5EF4-FFF2-40B4-BE49-F238E27FC236}">
+                <a16:creationId xmlns:a16="http://schemas.microsoft.com/office/drawing/2014/main" id="{B898748A-FDF0-4F8D-8850-78FACBFA25FA}"/>
+              </a:ext>
+            </a:extLst>
+          </p:cNvPr>
+          <p:cNvSpPr/>
+          <p:nvPr/>
+        </p:nvSpPr>
+        <p:spPr>
+          <a:xfrm>
+            <a:off x="-1" y="0"/>
+            <a:ext cx="7199313" cy="10799763"/>
+          </a:xfrm>
+          <a:prstGeom prst="rect">
+            <a:avLst/>
+          </a:prstGeom>
+          <a:noFill/>
+          <a:ln w="38100">
+            <a:solidFill>
+              <a:schemeClr val="tx1"/>
+            </a:solidFill>
+          </a:ln>
+        </p:spPr>
+        <p:style>
+          <a:lnRef idx="2">
+            <a:schemeClr val="accent1">
+              <a:shade val="50000"/>
+            </a:schemeClr>
+          </a:lnRef>
+          <a:fillRef idx="1">
+            <a:schemeClr val="accent1"/>
+          </a:fillRef>
+          <a:effectRef idx="0">
+            <a:schemeClr val="accent1"/>
+          </a:effectRef>
+          <a:fontRef idx="minor">
+            <a:schemeClr val="lt1"/>
+          </a:fontRef>
+        </p:style>
+        <p:txBody>
+          <a:bodyPr rtlCol="0" anchor="ctr"/>
+          <a:lstStyle/>
+          <a:p>
+            <a:pPr algn="ctr"/>
+            <a:endParaRPr lang="en-GB"/>
+          </a:p>
+        </p:txBody>
+      </p:sp>
     </p:spTree>
     <p:extLst>
       <p:ext uri="{BB962C8B-B14F-4D97-AF65-F5344CB8AC3E}">
@@ -11008,6 +11569,58 @@
           </a:p>
         </p:txBody>
       </p:sp>
+      <p:sp>
+        <p:nvSpPr>
+          <p:cNvPr id="51" name="Rectangle 50">
+            <a:extLst>
+              <a:ext uri="{FF2B5EF4-FFF2-40B4-BE49-F238E27FC236}">
+                <a16:creationId xmlns:a16="http://schemas.microsoft.com/office/drawing/2014/main" id="{572AC013-DC85-4A1F-A55E-AE07AE9EB491}"/>
+              </a:ext>
+            </a:extLst>
+          </p:cNvPr>
+          <p:cNvSpPr/>
+          <p:nvPr/>
+        </p:nvSpPr>
+        <p:spPr>
+          <a:xfrm>
+            <a:off x="-1" y="0"/>
+            <a:ext cx="7199313" cy="10799763"/>
+          </a:xfrm>
+          <a:prstGeom prst="rect">
+            <a:avLst/>
+          </a:prstGeom>
+          <a:noFill/>
+          <a:ln w="38100">
+            <a:solidFill>
+              <a:schemeClr val="tx1"/>
+            </a:solidFill>
+          </a:ln>
+        </p:spPr>
+        <p:style>
+          <a:lnRef idx="2">
+            <a:schemeClr val="accent1">
+              <a:shade val="50000"/>
+            </a:schemeClr>
+          </a:lnRef>
+          <a:fillRef idx="1">
+            <a:schemeClr val="accent1"/>
+          </a:fillRef>
+          <a:effectRef idx="0">
+            <a:schemeClr val="accent1"/>
+          </a:effectRef>
+          <a:fontRef idx="minor">
+            <a:schemeClr val="lt1"/>
+          </a:fontRef>
+        </p:style>
+        <p:txBody>
+          <a:bodyPr rtlCol="0" anchor="ctr"/>
+          <a:lstStyle/>
+          <a:p>
+            <a:pPr algn="ctr"/>
+            <a:endParaRPr lang="en-GB"/>
+          </a:p>
+        </p:txBody>
+      </p:sp>
     </p:spTree>
     <p:extLst>
       <p:ext uri="{BB962C8B-B14F-4D97-AF65-F5344CB8AC3E}">
@@ -12977,6 +13590,58 @@
           </a:p>
         </p:txBody>
       </p:sp>
+      <p:sp>
+        <p:nvSpPr>
+          <p:cNvPr id="47" name="Rectangle 46">
+            <a:extLst>
+              <a:ext uri="{FF2B5EF4-FFF2-40B4-BE49-F238E27FC236}">
+                <a16:creationId xmlns:a16="http://schemas.microsoft.com/office/drawing/2014/main" id="{9A5B2A93-5326-4CBE-812B-1AA4D59726AA}"/>
+              </a:ext>
+            </a:extLst>
+          </p:cNvPr>
+          <p:cNvSpPr/>
+          <p:nvPr/>
+        </p:nvSpPr>
+        <p:spPr>
+          <a:xfrm>
+            <a:off x="-1" y="0"/>
+            <a:ext cx="7199313" cy="10799763"/>
+          </a:xfrm>
+          <a:prstGeom prst="rect">
+            <a:avLst/>
+          </a:prstGeom>
+          <a:noFill/>
+          <a:ln w="38100">
+            <a:solidFill>
+              <a:schemeClr val="tx1"/>
+            </a:solidFill>
+          </a:ln>
+        </p:spPr>
+        <p:style>
+          <a:lnRef idx="2">
+            <a:schemeClr val="accent1">
+              <a:shade val="50000"/>
+            </a:schemeClr>
+          </a:lnRef>
+          <a:fillRef idx="1">
+            <a:schemeClr val="accent1"/>
+          </a:fillRef>
+          <a:effectRef idx="0">
+            <a:schemeClr val="accent1"/>
+          </a:effectRef>
+          <a:fontRef idx="minor">
+            <a:schemeClr val="lt1"/>
+          </a:fontRef>
+        </p:style>
+        <p:txBody>
+          <a:bodyPr rtlCol="0" anchor="ctr"/>
+          <a:lstStyle/>
+          <a:p>
+            <a:pPr algn="ctr"/>
+            <a:endParaRPr lang="en-GB"/>
+          </a:p>
+        </p:txBody>
+      </p:sp>
     </p:spTree>
     <p:extLst>
       <p:ext uri="{BB962C8B-B14F-4D97-AF65-F5344CB8AC3E}">
@@ -13482,6 +14147,58 @@
           </a:p>
         </p:txBody>
       </p:sp>
+      <p:sp>
+        <p:nvSpPr>
+          <p:cNvPr id="17" name="Rectangle 16">
+            <a:extLst>
+              <a:ext uri="{FF2B5EF4-FFF2-40B4-BE49-F238E27FC236}">
+                <a16:creationId xmlns:a16="http://schemas.microsoft.com/office/drawing/2014/main" id="{092F7033-FFFB-4E5B-8D66-523AC309DD61}"/>
+              </a:ext>
+            </a:extLst>
+          </p:cNvPr>
+          <p:cNvSpPr/>
+          <p:nvPr/>
+        </p:nvSpPr>
+        <p:spPr>
+          <a:xfrm>
+            <a:off x="-1" y="0"/>
+            <a:ext cx="7199313" cy="10799763"/>
+          </a:xfrm>
+          <a:prstGeom prst="rect">
+            <a:avLst/>
+          </a:prstGeom>
+          <a:noFill/>
+          <a:ln w="38100">
+            <a:solidFill>
+              <a:schemeClr val="tx1"/>
+            </a:solidFill>
+          </a:ln>
+        </p:spPr>
+        <p:style>
+          <a:lnRef idx="2">
+            <a:schemeClr val="accent1">
+              <a:shade val="50000"/>
+            </a:schemeClr>
+          </a:lnRef>
+          <a:fillRef idx="1">
+            <a:schemeClr val="accent1"/>
+          </a:fillRef>
+          <a:effectRef idx="0">
+            <a:schemeClr val="accent1"/>
+          </a:effectRef>
+          <a:fontRef idx="minor">
+            <a:schemeClr val="lt1"/>
+          </a:fontRef>
+        </p:style>
+        <p:txBody>
+          <a:bodyPr rtlCol="0" anchor="ctr"/>
+          <a:lstStyle/>
+          <a:p>
+            <a:pPr algn="ctr"/>
+            <a:endParaRPr lang="en-GB"/>
+          </a:p>
+        </p:txBody>
+      </p:sp>
     </p:spTree>
     <p:extLst>
       <p:ext uri="{BB962C8B-B14F-4D97-AF65-F5344CB8AC3E}">
@@ -14067,6 +14784,58 @@
           </a:prstGeom>
         </p:spPr>
       </p:pic>
+      <p:sp>
+        <p:nvSpPr>
+          <p:cNvPr id="19" name="Rectangle 18">
+            <a:extLst>
+              <a:ext uri="{FF2B5EF4-FFF2-40B4-BE49-F238E27FC236}">
+                <a16:creationId xmlns:a16="http://schemas.microsoft.com/office/drawing/2014/main" id="{0C904593-DA8B-4014-A4CD-42E5D850AF69}"/>
+              </a:ext>
+            </a:extLst>
+          </p:cNvPr>
+          <p:cNvSpPr/>
+          <p:nvPr/>
+        </p:nvSpPr>
+        <p:spPr>
+          <a:xfrm>
+            <a:off x="-1" y="0"/>
+            <a:ext cx="7199313" cy="10799763"/>
+          </a:xfrm>
+          <a:prstGeom prst="rect">
+            <a:avLst/>
+          </a:prstGeom>
+          <a:noFill/>
+          <a:ln w="38100">
+            <a:solidFill>
+              <a:schemeClr val="tx1"/>
+            </a:solidFill>
+          </a:ln>
+        </p:spPr>
+        <p:style>
+          <a:lnRef idx="2">
+            <a:schemeClr val="accent1">
+              <a:shade val="50000"/>
+            </a:schemeClr>
+          </a:lnRef>
+          <a:fillRef idx="1">
+            <a:schemeClr val="accent1"/>
+          </a:fillRef>
+          <a:effectRef idx="0">
+            <a:schemeClr val="accent1"/>
+          </a:effectRef>
+          <a:fontRef idx="minor">
+            <a:schemeClr val="lt1"/>
+          </a:fontRef>
+        </p:style>
+        <p:txBody>
+          <a:bodyPr rtlCol="0" anchor="ctr"/>
+          <a:lstStyle/>
+          <a:p>
+            <a:pPr algn="ctr"/>
+            <a:endParaRPr lang="en-GB"/>
+          </a:p>
+        </p:txBody>
+      </p:sp>
     </p:spTree>
     <p:extLst>
       <p:ext uri="{BB962C8B-B14F-4D97-AF65-F5344CB8AC3E}">

</xml_diff>